<commit_message>
UM update for reviewer comments
</commit_message>
<xml_diff>
--- a/documentation/figures/figures.pptx
+++ b/documentation/figures/figures.pptx
@@ -8,6 +8,8 @@
     <p:sldId id="256" r:id="rId2"/>
     <p:sldId id="257" r:id="rId3"/>
     <p:sldId id="259" r:id="rId4"/>
+    <p:sldId id="260" r:id="rId5"/>
+    <p:sldId id="261" r:id="rId6"/>
   </p:sldIdLst>
   <p:sldSz cx="9144000" cy="6858000" type="screen4x3"/>
   <p:notesSz cx="6858000" cy="9144000"/>
@@ -305,7 +307,7 @@
             <a:fld id="{1D8BD707-D9CF-40AE-B4C6-C98DA3205C09}" type="datetimeFigureOut">
               <a:rPr lang="en-US" smtClean="0"/>
               <a:pPr/>
-              <a:t>2/3/2017</a:t>
+              <a:t>2/23/2017</a:t>
             </a:fld>
             <a:endParaRPr lang="en-US"/>
           </a:p>
@@ -470,7 +472,7 @@
             <a:fld id="{1D8BD707-D9CF-40AE-B4C6-C98DA3205C09}" type="datetimeFigureOut">
               <a:rPr lang="en-US" smtClean="0"/>
               <a:pPr/>
-              <a:t>2/3/2017</a:t>
+              <a:t>2/23/2017</a:t>
             </a:fld>
             <a:endParaRPr lang="en-US"/>
           </a:p>
@@ -645,7 +647,7 @@
             <a:fld id="{1D8BD707-D9CF-40AE-B4C6-C98DA3205C09}" type="datetimeFigureOut">
               <a:rPr lang="en-US" smtClean="0"/>
               <a:pPr/>
-              <a:t>2/3/2017</a:t>
+              <a:t>2/23/2017</a:t>
             </a:fld>
             <a:endParaRPr lang="en-US"/>
           </a:p>
@@ -810,7 +812,7 @@
             <a:fld id="{1D8BD707-D9CF-40AE-B4C6-C98DA3205C09}" type="datetimeFigureOut">
               <a:rPr lang="en-US" smtClean="0"/>
               <a:pPr/>
-              <a:t>2/3/2017</a:t>
+              <a:t>2/23/2017</a:t>
             </a:fld>
             <a:endParaRPr lang="en-US"/>
           </a:p>
@@ -1052,7 +1054,7 @@
             <a:fld id="{1D8BD707-D9CF-40AE-B4C6-C98DA3205C09}" type="datetimeFigureOut">
               <a:rPr lang="en-US" smtClean="0"/>
               <a:pPr/>
-              <a:t>2/3/2017</a:t>
+              <a:t>2/23/2017</a:t>
             </a:fld>
             <a:endParaRPr lang="en-US"/>
           </a:p>
@@ -1334,7 +1336,7 @@
             <a:fld id="{1D8BD707-D9CF-40AE-B4C6-C98DA3205C09}" type="datetimeFigureOut">
               <a:rPr lang="en-US" smtClean="0"/>
               <a:pPr/>
-              <a:t>2/3/2017</a:t>
+              <a:t>2/23/2017</a:t>
             </a:fld>
             <a:endParaRPr lang="en-US"/>
           </a:p>
@@ -1750,7 +1752,7 @@
             <a:fld id="{1D8BD707-D9CF-40AE-B4C6-C98DA3205C09}" type="datetimeFigureOut">
               <a:rPr lang="en-US" smtClean="0"/>
               <a:pPr/>
-              <a:t>2/3/2017</a:t>
+              <a:t>2/23/2017</a:t>
             </a:fld>
             <a:endParaRPr lang="en-US"/>
           </a:p>
@@ -1864,7 +1866,7 @@
             <a:fld id="{1D8BD707-D9CF-40AE-B4C6-C98DA3205C09}" type="datetimeFigureOut">
               <a:rPr lang="en-US" smtClean="0"/>
               <a:pPr/>
-              <a:t>2/3/2017</a:t>
+              <a:t>2/23/2017</a:t>
             </a:fld>
             <a:endParaRPr lang="en-US"/>
           </a:p>
@@ -1956,7 +1958,7 @@
             <a:fld id="{1D8BD707-D9CF-40AE-B4C6-C98DA3205C09}" type="datetimeFigureOut">
               <a:rPr lang="en-US" smtClean="0"/>
               <a:pPr/>
-              <a:t>2/3/2017</a:t>
+              <a:t>2/23/2017</a:t>
             </a:fld>
             <a:endParaRPr lang="en-US"/>
           </a:p>
@@ -2228,7 +2230,7 @@
             <a:fld id="{1D8BD707-D9CF-40AE-B4C6-C98DA3205C09}" type="datetimeFigureOut">
               <a:rPr lang="en-US" smtClean="0"/>
               <a:pPr/>
-              <a:t>2/3/2017</a:t>
+              <a:t>2/23/2017</a:t>
             </a:fld>
             <a:endParaRPr lang="en-US"/>
           </a:p>
@@ -2477,7 +2479,7 @@
             <a:fld id="{1D8BD707-D9CF-40AE-B4C6-C98DA3205C09}" type="datetimeFigureOut">
               <a:rPr lang="en-US" smtClean="0"/>
               <a:pPr/>
-              <a:t>2/3/2017</a:t>
+              <a:t>2/23/2017</a:t>
             </a:fld>
             <a:endParaRPr lang="en-US"/>
           </a:p>
@@ -2685,7 +2687,7 @@
             <a:fld id="{1D8BD707-D9CF-40AE-B4C6-C98DA3205C09}" type="datetimeFigureOut">
               <a:rPr lang="en-US" smtClean="0"/>
               <a:pPr/>
-              <a:t>2/3/2017</a:t>
+              <a:t>2/23/2017</a:t>
             </a:fld>
             <a:endParaRPr lang="en-US"/>
           </a:p>
@@ -3353,7 +3355,7 @@
       </p:grpSpPr>
       <p:grpSp>
         <p:nvGrpSpPr>
-          <p:cNvPr id="17" name="Group 16"/>
+          <p:cNvPr id="6" name="Group 5"/>
           <p:cNvGrpSpPr/>
           <p:nvPr/>
         </p:nvGrpSpPr>
@@ -3365,16 +3367,165 @@
             <a:chExt cx="5867400" cy="2059416"/>
           </a:xfrm>
         </p:grpSpPr>
+        <p:grpSp>
+          <p:nvGrpSpPr>
+            <p:cNvPr id="17" name="Group 16"/>
+            <p:cNvGrpSpPr/>
+            <p:nvPr/>
+          </p:nvGrpSpPr>
+          <p:grpSpPr>
+            <a:xfrm>
+              <a:off x="381000" y="3655584"/>
+              <a:ext cx="5867400" cy="2059416"/>
+              <a:chOff x="381000" y="3655584"/>
+              <a:chExt cx="5867400" cy="2059416"/>
+            </a:xfrm>
+          </p:grpSpPr>
+          <p:sp>
+            <p:nvSpPr>
+              <p:cNvPr id="16" name="Rectangle 15"/>
+              <p:cNvSpPr/>
+              <p:nvPr/>
+            </p:nvSpPr>
+            <p:spPr>
+              <a:xfrm>
+                <a:off x="381000" y="3655584"/>
+                <a:ext cx="5867400" cy="2059416"/>
+              </a:xfrm>
+              <a:prstGeom prst="rect">
+                <a:avLst/>
+              </a:prstGeom>
+              <a:solidFill>
+                <a:schemeClr val="bg1"/>
+              </a:solidFill>
+              <a:ln>
+                <a:noFill/>
+              </a:ln>
+            </p:spPr>
+            <p:style>
+              <a:lnRef idx="2">
+                <a:schemeClr val="accent1">
+                  <a:shade val="50000"/>
+                </a:schemeClr>
+              </a:lnRef>
+              <a:fillRef idx="1">
+                <a:schemeClr val="accent1"/>
+              </a:fillRef>
+              <a:effectRef idx="0">
+                <a:schemeClr val="accent1"/>
+              </a:effectRef>
+              <a:fontRef idx="minor">
+                <a:schemeClr val="lt1"/>
+              </a:fontRef>
+            </p:style>
+            <p:txBody>
+              <a:bodyPr rtlCol="0" anchor="ctr"/>
+              <a:lstStyle/>
+              <a:p>
+                <a:pPr algn="ctr"/>
+                <a:endParaRPr lang="en-US"/>
+              </a:p>
+            </p:txBody>
+          </p:sp>
+          <p:pic>
+            <p:nvPicPr>
+              <p:cNvPr id="7" name="Picture 6"/>
+              <p:cNvPicPr>
+                <a:picLocks noChangeAspect="1"/>
+              </p:cNvPicPr>
+              <p:nvPr/>
+            </p:nvPicPr>
+            <p:blipFill rotWithShape="1">
+              <a:blip r:embed="rId2">
+                <a:extLst>
+                  <a:ext uri="{28A0092B-C50C-407E-A947-70E740481C1C}">
+                    <a14:useLocalDpi xmlns:a14="http://schemas.microsoft.com/office/drawing/2010/main" val="0"/>
+                  </a:ext>
+                </a:extLst>
+              </a:blip>
+              <a:srcRect l="23407" t="30270" r="52032" b="45492"/>
+              <a:stretch/>
+            </p:blipFill>
+            <p:spPr>
+              <a:xfrm>
+                <a:off x="3581400" y="3954066"/>
+                <a:ext cx="2384666" cy="1563065"/>
+              </a:xfrm>
+              <a:prstGeom prst="rect">
+                <a:avLst/>
+              </a:prstGeom>
+            </p:spPr>
+          </p:pic>
+          <p:pic>
+            <p:nvPicPr>
+              <p:cNvPr id="8" name="Picture 7"/>
+              <p:cNvPicPr>
+                <a:picLocks noChangeAspect="1"/>
+              </p:cNvPicPr>
+              <p:nvPr/>
+            </p:nvPicPr>
+            <p:blipFill>
+              <a:blip r:embed="rId3">
+                <a:extLst>
+                  <a:ext uri="{28A0092B-C50C-407E-A947-70E740481C1C}">
+                    <a14:useLocalDpi xmlns:a14="http://schemas.microsoft.com/office/drawing/2010/main" val="0"/>
+                  </a:ext>
+                </a:extLst>
+              </a:blip>
+              <a:stretch>
+                <a:fillRect/>
+              </a:stretch>
+            </p:blipFill>
+            <p:spPr>
+              <a:xfrm>
+                <a:off x="533400" y="3733800"/>
+                <a:ext cx="3062647" cy="1858352"/>
+              </a:xfrm>
+              <a:prstGeom prst="rect">
+                <a:avLst/>
+              </a:prstGeom>
+            </p:spPr>
+          </p:pic>
+          <p:sp>
+            <p:nvSpPr>
+              <p:cNvPr id="14" name="TextBox 13"/>
+              <p:cNvSpPr txBox="1"/>
+              <p:nvPr/>
+            </p:nvSpPr>
+            <p:spPr>
+              <a:xfrm>
+                <a:off x="914400" y="3655584"/>
+                <a:ext cx="5334000" cy="246221"/>
+              </a:xfrm>
+              <a:prstGeom prst="rect">
+                <a:avLst/>
+              </a:prstGeom>
+              <a:noFill/>
+            </p:spPr>
+            <p:txBody>
+              <a:bodyPr wrap="square" rtlCol="0">
+                <a:spAutoFit/>
+              </a:bodyPr>
+              <a:lstStyle/>
+              <a:p>
+                <a:r>
+                  <a:rPr lang="en-US" sz="1000" dirty="0"/>
+                  <a:t>State Transition plot for time-series metrics            Network graphic for spatially distributed metrics</a:t>
+                </a:r>
+              </a:p>
+            </p:txBody>
+          </p:sp>
+        </p:grpSp>
         <p:sp>
           <p:nvSpPr>
-            <p:cNvPr id="16" name="Rectangle 15"/>
-            <p:cNvSpPr/>
+            <p:cNvPr id="5" name="TextBox 4"/>
+            <p:cNvSpPr txBox="1"/>
             <p:nvPr/>
           </p:nvSpPr>
           <p:spPr>
             <a:xfrm>
-              <a:off x="381000" y="3655584"/>
-              <a:ext cx="5867400" cy="2059416"/>
+              <a:off x="1637655" y="4416755"/>
+              <a:ext cx="517129" cy="246221"/>
             </a:xfrm>
             <a:prstGeom prst="rect">
               <a:avLst/>
@@ -3383,123 +3534,601 @@
               <a:schemeClr val="bg1"/>
             </a:solidFill>
             <a:ln>
-              <a:noFill/>
+              <a:solidFill>
+                <a:srgbClr val="C00000"/>
+              </a:solidFill>
             </a:ln>
           </p:spPr>
-          <p:style>
-            <a:lnRef idx="2">
-              <a:schemeClr val="accent1">
-                <a:shade val="50000"/>
-              </a:schemeClr>
-            </a:lnRef>
-            <a:fillRef idx="1">
-              <a:schemeClr val="accent1"/>
-            </a:fillRef>
-            <a:effectRef idx="0">
-              <a:schemeClr val="accent1"/>
-            </a:effectRef>
-            <a:fontRef idx="minor">
-              <a:schemeClr val="lt1"/>
-            </a:fontRef>
-          </p:style>
           <p:txBody>
-            <a:bodyPr rtlCol="0" anchor="ctr"/>
+            <a:bodyPr wrap="none" lIns="45720" tIns="45720" rIns="45720" bIns="45720" rtlCol="0" anchor="ctr" anchorCtr="0">
+              <a:spAutoFit/>
+            </a:bodyPr>
             <a:lstStyle/>
             <a:p>
-              <a:pPr algn="ctr"/>
-              <a:endParaRPr lang="en-US"/>
+              <a:r>
+                <a:rPr lang="en-US" sz="1000" dirty="0">
+                  <a:solidFill>
+                    <a:srgbClr val="C00000"/>
+                  </a:solidFill>
+                </a:rPr>
+                <a:t>Incident</a:t>
+              </a:r>
             </a:p>
           </p:txBody>
         </p:sp>
-        <p:pic>
-          <p:nvPicPr>
-            <p:cNvPr id="7" name="Picture 6"/>
-            <p:cNvPicPr>
-              <a:picLocks noChangeAspect="1"/>
-            </p:cNvPicPr>
-            <p:nvPr/>
-          </p:nvPicPr>
-          <p:blipFill rotWithShape="1">
-            <a:blip r:embed="rId2">
-              <a:extLst>
-                <a:ext uri="{28A0092B-C50C-407E-A947-70E740481C1C}">
-                  <a14:useLocalDpi xmlns:a14="http://schemas.microsoft.com/office/drawing/2010/main" val="0"/>
-                </a:ext>
-              </a:extLst>
-            </a:blip>
-            <a:srcRect l="23407" t="30270" r="52032" b="45492"/>
-            <a:stretch/>
-          </p:blipFill>
-          <p:spPr>
-            <a:xfrm>
-              <a:off x="3581400" y="3954066"/>
-              <a:ext cx="2384666" cy="1563065"/>
-            </a:xfrm>
-            <a:prstGeom prst="rect">
-              <a:avLst/>
-            </a:prstGeom>
-          </p:spPr>
-        </p:pic>
-        <p:pic>
-          <p:nvPicPr>
-            <p:cNvPr id="8" name="Picture 7"/>
-            <p:cNvPicPr>
-              <a:picLocks noChangeAspect="1"/>
-            </p:cNvPicPr>
-            <p:nvPr/>
-          </p:nvPicPr>
-          <p:blipFill>
-            <a:blip r:embed="rId3">
-              <a:extLst>
-                <a:ext uri="{28A0092B-C50C-407E-A947-70E740481C1C}">
-                  <a14:useLocalDpi xmlns:a14="http://schemas.microsoft.com/office/drawing/2010/main" val="0"/>
-                </a:ext>
-              </a:extLst>
-            </a:blip>
-            <a:stretch>
-              <a:fillRect/>
-            </a:stretch>
-          </p:blipFill>
-          <p:spPr>
-            <a:xfrm>
-              <a:off x="533400" y="3733800"/>
-              <a:ext cx="3062647" cy="1858352"/>
-            </a:xfrm>
-            <a:prstGeom prst="rect">
-              <a:avLst/>
-            </a:prstGeom>
-          </p:spPr>
-        </p:pic>
         <p:sp>
           <p:nvSpPr>
-            <p:cNvPr id="14" name="TextBox 13"/>
+            <p:cNvPr id="13" name="TextBox 12"/>
             <p:cNvSpPr txBox="1"/>
             <p:nvPr/>
           </p:nvSpPr>
           <p:spPr>
             <a:xfrm>
-              <a:off x="914400" y="3655584"/>
-              <a:ext cx="5334000" cy="246221"/>
+              <a:off x="2218839" y="5113683"/>
+              <a:ext cx="975588" cy="246221"/>
             </a:xfrm>
             <a:prstGeom prst="rect">
               <a:avLst/>
             </a:prstGeom>
-            <a:noFill/>
+            <a:solidFill>
+              <a:schemeClr val="bg1"/>
+            </a:solidFill>
+            <a:ln>
+              <a:solidFill>
+                <a:srgbClr val="C00000"/>
+              </a:solidFill>
+            </a:ln>
           </p:spPr>
           <p:txBody>
-            <a:bodyPr wrap="square" rtlCol="0">
+            <a:bodyPr wrap="none" lIns="45720" tIns="45720" rIns="45720" bIns="45720" rtlCol="0" anchor="ctr" anchorCtr="0">
               <a:spAutoFit/>
             </a:bodyPr>
             <a:lstStyle/>
             <a:p>
               <a:r>
-                <a:rPr lang="en-US" sz="1000" dirty="0"/>
-                <a:t>State Transition plot for time-series metrics            Network graphic for spatially distributed metrics</a:t>
+                <a:rPr lang="en-US" sz="1000" dirty="0">
+                  <a:solidFill>
+                    <a:srgbClr val="C00000"/>
+                  </a:solidFill>
+                </a:rPr>
+                <a:t>Resilience Action</a:t>
               </a:r>
             </a:p>
           </p:txBody>
         </p:sp>
       </p:grpSp>
+      <p:sp>
+        <p:nvSpPr>
+          <p:cNvPr id="23" name="Flowchart: Connector 22"/>
+          <p:cNvSpPr/>
+          <p:nvPr/>
+        </p:nvSpPr>
+        <p:spPr>
+          <a:xfrm>
+            <a:off x="1447800" y="457200"/>
+            <a:ext cx="91440" cy="91440"/>
+          </a:xfrm>
+          <a:prstGeom prst="flowChartConnector">
+            <a:avLst/>
+          </a:prstGeom>
+          <a:effectLst/>
+        </p:spPr>
+        <p:style>
+          <a:lnRef idx="1">
+            <a:schemeClr val="dk1"/>
+          </a:lnRef>
+          <a:fillRef idx="2">
+            <a:schemeClr val="dk1"/>
+          </a:fillRef>
+          <a:effectRef idx="1">
+            <a:schemeClr val="dk1"/>
+          </a:effectRef>
+          <a:fontRef idx="minor">
+            <a:schemeClr val="dk1"/>
+          </a:fontRef>
+        </p:style>
+        <p:txBody>
+          <a:bodyPr rtlCol="0" anchor="ctr"/>
+          <a:lstStyle/>
+          <a:p>
+            <a:pPr algn="ctr"/>
+            <a:endParaRPr lang="en-US"/>
+          </a:p>
+        </p:txBody>
+      </p:sp>
+      <p:sp>
+        <p:nvSpPr>
+          <p:cNvPr id="24" name="Flowchart: Connector 23"/>
+          <p:cNvSpPr/>
+          <p:nvPr/>
+        </p:nvSpPr>
+        <p:spPr>
+          <a:xfrm>
+            <a:off x="2064723" y="1508037"/>
+            <a:ext cx="91440" cy="91440"/>
+          </a:xfrm>
+          <a:prstGeom prst="flowChartConnector">
+            <a:avLst/>
+          </a:prstGeom>
+          <a:effectLst/>
+        </p:spPr>
+        <p:style>
+          <a:lnRef idx="1">
+            <a:schemeClr val="dk1"/>
+          </a:lnRef>
+          <a:fillRef idx="2">
+            <a:schemeClr val="dk1"/>
+          </a:fillRef>
+          <a:effectRef idx="1">
+            <a:schemeClr val="dk1"/>
+          </a:effectRef>
+          <a:fontRef idx="minor">
+            <a:schemeClr val="dk1"/>
+          </a:fontRef>
+        </p:style>
+        <p:txBody>
+          <a:bodyPr rtlCol="0" anchor="ctr"/>
+          <a:lstStyle/>
+          <a:p>
+            <a:pPr algn="ctr"/>
+            <a:endParaRPr lang="en-US"/>
+          </a:p>
+        </p:txBody>
+      </p:sp>
+      <p:sp>
+        <p:nvSpPr>
+          <p:cNvPr id="25" name="Flowchart: Connector 24"/>
+          <p:cNvSpPr/>
+          <p:nvPr/>
+        </p:nvSpPr>
+        <p:spPr>
+          <a:xfrm>
+            <a:off x="838200" y="1676400"/>
+            <a:ext cx="91440" cy="91440"/>
+          </a:xfrm>
+          <a:prstGeom prst="flowChartConnector">
+            <a:avLst/>
+          </a:prstGeom>
+          <a:effectLst/>
+        </p:spPr>
+        <p:style>
+          <a:lnRef idx="1">
+            <a:schemeClr val="dk1"/>
+          </a:lnRef>
+          <a:fillRef idx="2">
+            <a:schemeClr val="dk1"/>
+          </a:fillRef>
+          <a:effectRef idx="1">
+            <a:schemeClr val="dk1"/>
+          </a:effectRef>
+          <a:fontRef idx="minor">
+            <a:schemeClr val="dk1"/>
+          </a:fontRef>
+        </p:style>
+        <p:txBody>
+          <a:bodyPr rtlCol="0" anchor="ctr"/>
+          <a:lstStyle/>
+          <a:p>
+            <a:pPr algn="ctr"/>
+            <a:endParaRPr lang="en-US"/>
+          </a:p>
+        </p:txBody>
+      </p:sp>
+      <p:sp>
+        <p:nvSpPr>
+          <p:cNvPr id="26" name="Flowchart: Connector 25"/>
+          <p:cNvSpPr/>
+          <p:nvPr/>
+        </p:nvSpPr>
+        <p:spPr>
+          <a:xfrm>
+            <a:off x="3108024" y="1842389"/>
+            <a:ext cx="91440" cy="91440"/>
+          </a:xfrm>
+          <a:prstGeom prst="flowChartConnector">
+            <a:avLst/>
+          </a:prstGeom>
+          <a:effectLst/>
+        </p:spPr>
+        <p:style>
+          <a:lnRef idx="1">
+            <a:schemeClr val="dk1"/>
+          </a:lnRef>
+          <a:fillRef idx="2">
+            <a:schemeClr val="dk1"/>
+          </a:fillRef>
+          <a:effectRef idx="1">
+            <a:schemeClr val="dk1"/>
+          </a:effectRef>
+          <a:fontRef idx="minor">
+            <a:schemeClr val="dk1"/>
+          </a:fontRef>
+        </p:style>
+        <p:txBody>
+          <a:bodyPr rtlCol="0" anchor="ctr"/>
+          <a:lstStyle/>
+          <a:p>
+            <a:pPr algn="ctr"/>
+            <a:endParaRPr lang="en-US"/>
+          </a:p>
+        </p:txBody>
+      </p:sp>
+      <p:sp>
+        <p:nvSpPr>
+          <p:cNvPr id="27" name="Flowchart: Connector 26"/>
+          <p:cNvSpPr/>
+          <p:nvPr/>
+        </p:nvSpPr>
+        <p:spPr>
+          <a:xfrm>
+            <a:off x="2667000" y="533400"/>
+            <a:ext cx="91440" cy="91440"/>
+          </a:xfrm>
+          <a:prstGeom prst="flowChartConnector">
+            <a:avLst/>
+          </a:prstGeom>
+          <a:effectLst/>
+        </p:spPr>
+        <p:style>
+          <a:lnRef idx="1">
+            <a:schemeClr val="dk1"/>
+          </a:lnRef>
+          <a:fillRef idx="2">
+            <a:schemeClr val="dk1"/>
+          </a:fillRef>
+          <a:effectRef idx="1">
+            <a:schemeClr val="dk1"/>
+          </a:effectRef>
+          <a:fontRef idx="minor">
+            <a:schemeClr val="dk1"/>
+          </a:fontRef>
+        </p:style>
+        <p:txBody>
+          <a:bodyPr rtlCol="0" anchor="ctr"/>
+          <a:lstStyle/>
+          <a:p>
+            <a:pPr algn="ctr"/>
+            <a:endParaRPr lang="en-US"/>
+          </a:p>
+        </p:txBody>
+      </p:sp>
+      <p:cxnSp>
+        <p:nvCxnSpPr>
+          <p:cNvPr id="29" name="Straight Arrow Connector 28"/>
+          <p:cNvCxnSpPr>
+            <a:stCxn id="25" idx="0"/>
+            <a:endCxn id="23" idx="4"/>
+          </p:cNvCxnSpPr>
+          <p:nvPr/>
+        </p:nvCxnSpPr>
+        <p:spPr>
+          <a:xfrm flipV="1">
+            <a:off x="883920" y="548640"/>
+            <a:ext cx="609600" cy="1127760"/>
+          </a:xfrm>
+          <a:prstGeom prst="straightConnector1">
+            <a:avLst/>
+          </a:prstGeom>
+          <a:ln>
+            <a:tailEnd type="triangle"/>
+          </a:ln>
+          <a:effectLst/>
+        </p:spPr>
+        <p:style>
+          <a:lnRef idx="1">
+            <a:schemeClr val="dk1"/>
+          </a:lnRef>
+          <a:fillRef idx="2">
+            <a:schemeClr val="dk1"/>
+          </a:fillRef>
+          <a:effectRef idx="1">
+            <a:schemeClr val="dk1"/>
+          </a:effectRef>
+          <a:fontRef idx="minor">
+            <a:schemeClr val="dk1"/>
+          </a:fontRef>
+        </p:style>
+      </p:cxnSp>
+      <p:cxnSp>
+        <p:nvCxnSpPr>
+          <p:cNvPr id="30" name="Straight Arrow Connector 29"/>
+          <p:cNvCxnSpPr>
+            <a:stCxn id="25" idx="6"/>
+            <a:endCxn id="24" idx="3"/>
+          </p:cNvCxnSpPr>
+          <p:nvPr/>
+        </p:nvCxnSpPr>
+        <p:spPr>
+          <a:xfrm flipV="1">
+            <a:off x="929640" y="1586086"/>
+            <a:ext cx="1148474" cy="136034"/>
+          </a:xfrm>
+          <a:prstGeom prst="straightConnector1">
+            <a:avLst/>
+          </a:prstGeom>
+          <a:ln>
+            <a:tailEnd type="triangle"/>
+          </a:ln>
+          <a:effectLst/>
+        </p:spPr>
+        <p:style>
+          <a:lnRef idx="1">
+            <a:schemeClr val="dk1"/>
+          </a:lnRef>
+          <a:fillRef idx="2">
+            <a:schemeClr val="dk1"/>
+          </a:fillRef>
+          <a:effectRef idx="1">
+            <a:schemeClr val="dk1"/>
+          </a:effectRef>
+          <a:fontRef idx="minor">
+            <a:schemeClr val="dk1"/>
+          </a:fontRef>
+        </p:style>
+      </p:cxnSp>
+      <p:cxnSp>
+        <p:nvCxnSpPr>
+          <p:cNvPr id="34" name="Straight Arrow Connector 33"/>
+          <p:cNvCxnSpPr>
+            <a:stCxn id="24" idx="7"/>
+            <a:endCxn id="27" idx="4"/>
+          </p:cNvCxnSpPr>
+          <p:nvPr/>
+        </p:nvCxnSpPr>
+        <p:spPr>
+          <a:xfrm flipV="1">
+            <a:off x="2142772" y="624840"/>
+            <a:ext cx="569948" cy="896588"/>
+          </a:xfrm>
+          <a:prstGeom prst="straightConnector1">
+            <a:avLst/>
+          </a:prstGeom>
+          <a:ln>
+            <a:tailEnd type="triangle"/>
+          </a:ln>
+          <a:effectLst/>
+        </p:spPr>
+        <p:style>
+          <a:lnRef idx="1">
+            <a:schemeClr val="dk1"/>
+          </a:lnRef>
+          <a:fillRef idx="2">
+            <a:schemeClr val="dk1"/>
+          </a:fillRef>
+          <a:effectRef idx="1">
+            <a:schemeClr val="dk1"/>
+          </a:effectRef>
+          <a:fontRef idx="minor">
+            <a:schemeClr val="dk1"/>
+          </a:fontRef>
+        </p:style>
+      </p:cxnSp>
+      <p:cxnSp>
+        <p:nvCxnSpPr>
+          <p:cNvPr id="37" name="Straight Arrow Connector 36"/>
+          <p:cNvCxnSpPr>
+            <a:stCxn id="26" idx="0"/>
+            <a:endCxn id="27" idx="5"/>
+          </p:cNvCxnSpPr>
+          <p:nvPr/>
+        </p:nvCxnSpPr>
+        <p:spPr>
+          <a:xfrm flipH="1" flipV="1">
+            <a:off x="2745049" y="611449"/>
+            <a:ext cx="408695" cy="1230940"/>
+          </a:xfrm>
+          <a:prstGeom prst="straightConnector1">
+            <a:avLst/>
+          </a:prstGeom>
+          <a:ln>
+            <a:tailEnd type="triangle"/>
+          </a:ln>
+          <a:effectLst/>
+        </p:spPr>
+        <p:style>
+          <a:lnRef idx="1">
+            <a:schemeClr val="dk1"/>
+          </a:lnRef>
+          <a:fillRef idx="2">
+            <a:schemeClr val="dk1"/>
+          </a:fillRef>
+          <a:effectRef idx="1">
+            <a:schemeClr val="dk1"/>
+          </a:effectRef>
+          <a:fontRef idx="minor">
+            <a:schemeClr val="dk1"/>
+          </a:fontRef>
+        </p:style>
+      </p:cxnSp>
+      <p:cxnSp>
+        <p:nvCxnSpPr>
+          <p:cNvPr id="54" name="Curved Connector 53"/>
+          <p:cNvCxnSpPr>
+            <a:stCxn id="24" idx="5"/>
+            <a:endCxn id="26" idx="2"/>
+          </p:cNvCxnSpPr>
+          <p:nvPr/>
+        </p:nvCxnSpPr>
+        <p:spPr>
+          <a:xfrm rot="16200000" flipH="1">
+            <a:off x="2474387" y="1254471"/>
+            <a:ext cx="302023" cy="965252"/>
+          </a:xfrm>
+          <a:prstGeom prst="curvedConnector2">
+            <a:avLst/>
+          </a:prstGeom>
+          <a:ln>
+            <a:tailEnd type="triangle"/>
+          </a:ln>
+          <a:effectLst/>
+        </p:spPr>
+        <p:style>
+          <a:lnRef idx="1">
+            <a:schemeClr val="dk1"/>
+          </a:lnRef>
+          <a:fillRef idx="2">
+            <a:schemeClr val="dk1"/>
+          </a:fillRef>
+          <a:effectRef idx="1">
+            <a:schemeClr val="dk1"/>
+          </a:effectRef>
+          <a:fontRef idx="minor">
+            <a:schemeClr val="dk1"/>
+          </a:fontRef>
+        </p:style>
+      </p:cxnSp>
+      <p:cxnSp>
+        <p:nvCxnSpPr>
+          <p:cNvPr id="55" name="Curved Connector 54"/>
+          <p:cNvCxnSpPr>
+            <a:stCxn id="24" idx="6"/>
+            <a:endCxn id="26" idx="1"/>
+          </p:cNvCxnSpPr>
+          <p:nvPr/>
+        </p:nvCxnSpPr>
+        <p:spPr>
+          <a:xfrm>
+            <a:off x="2156163" y="1553757"/>
+            <a:ext cx="965252" cy="302023"/>
+          </a:xfrm>
+          <a:prstGeom prst="curvedConnector2">
+            <a:avLst/>
+          </a:prstGeom>
+          <a:ln>
+            <a:tailEnd type="triangle"/>
+          </a:ln>
+          <a:effectLst/>
+        </p:spPr>
+        <p:style>
+          <a:lnRef idx="1">
+            <a:schemeClr val="dk1"/>
+          </a:lnRef>
+          <a:fillRef idx="2">
+            <a:schemeClr val="dk1"/>
+          </a:fillRef>
+          <a:effectRef idx="1">
+            <a:schemeClr val="dk1"/>
+          </a:effectRef>
+          <a:fontRef idx="minor">
+            <a:schemeClr val="dk1"/>
+          </a:fontRef>
+        </p:style>
+      </p:cxnSp>
+      <p:cxnSp>
+        <p:nvCxnSpPr>
+          <p:cNvPr id="58" name="Straight Arrow Connector 57"/>
+          <p:cNvCxnSpPr>
+            <a:stCxn id="23" idx="5"/>
+            <a:endCxn id="24" idx="1"/>
+          </p:cNvCxnSpPr>
+          <p:nvPr/>
+        </p:nvCxnSpPr>
+        <p:spPr>
+          <a:xfrm>
+            <a:off x="1525849" y="535249"/>
+            <a:ext cx="552265" cy="986179"/>
+          </a:xfrm>
+          <a:prstGeom prst="straightConnector1">
+            <a:avLst/>
+          </a:prstGeom>
+          <a:ln>
+            <a:tailEnd type="triangle"/>
+          </a:ln>
+          <a:effectLst/>
+        </p:spPr>
+        <p:style>
+          <a:lnRef idx="1">
+            <a:schemeClr val="dk1"/>
+          </a:lnRef>
+          <a:fillRef idx="2">
+            <a:schemeClr val="dk1"/>
+          </a:fillRef>
+          <a:effectRef idx="1">
+            <a:schemeClr val="dk1"/>
+          </a:effectRef>
+          <a:fontRef idx="minor">
+            <a:schemeClr val="dk1"/>
+          </a:fontRef>
+        </p:style>
+      </p:cxnSp>
+      <p:cxnSp>
+        <p:nvCxnSpPr>
+          <p:cNvPr id="77" name="Curved Connector 76"/>
+          <p:cNvCxnSpPr>
+            <a:stCxn id="23" idx="7"/>
+            <a:endCxn id="27" idx="1"/>
+          </p:cNvCxnSpPr>
+          <p:nvPr/>
+        </p:nvCxnSpPr>
+        <p:spPr>
+          <a:xfrm rot="16200000" flipH="1">
+            <a:off x="2065020" y="-68580"/>
+            <a:ext cx="76200" cy="1154542"/>
+          </a:xfrm>
+          <a:prstGeom prst="curvedConnector3">
+            <a:avLst>
+              <a:gd name="adj1" fmla="val -154862"/>
+            </a:avLst>
+          </a:prstGeom>
+          <a:ln>
+            <a:tailEnd type="triangle"/>
+          </a:ln>
+          <a:effectLst/>
+        </p:spPr>
+        <p:style>
+          <a:lnRef idx="1">
+            <a:schemeClr val="dk1"/>
+          </a:lnRef>
+          <a:fillRef idx="2">
+            <a:schemeClr val="dk1"/>
+          </a:fillRef>
+          <a:effectRef idx="1">
+            <a:schemeClr val="dk1"/>
+          </a:effectRef>
+          <a:fontRef idx="minor">
+            <a:schemeClr val="dk1"/>
+          </a:fontRef>
+        </p:style>
+      </p:cxnSp>
+      <p:cxnSp>
+        <p:nvCxnSpPr>
+          <p:cNvPr id="85" name="Curved Connector 84"/>
+          <p:cNvCxnSpPr>
+            <a:stCxn id="27" idx="3"/>
+            <a:endCxn id="23" idx="5"/>
+          </p:cNvCxnSpPr>
+          <p:nvPr/>
+        </p:nvCxnSpPr>
+        <p:spPr>
+          <a:xfrm rot="5400000" flipH="1">
+            <a:off x="2065020" y="-3922"/>
+            <a:ext cx="76200" cy="1154542"/>
+          </a:xfrm>
+          <a:prstGeom prst="curvedConnector3">
+            <a:avLst>
+              <a:gd name="adj1" fmla="val -83676"/>
+            </a:avLst>
+          </a:prstGeom>
+          <a:ln>
+            <a:tailEnd type="triangle"/>
+          </a:ln>
+          <a:effectLst/>
+        </p:spPr>
+        <p:style>
+          <a:lnRef idx="1">
+            <a:schemeClr val="dk1"/>
+          </a:lnRef>
+          <a:fillRef idx="2">
+            <a:schemeClr val="dk1"/>
+          </a:fillRef>
+          <a:effectRef idx="1">
+            <a:schemeClr val="dk1"/>
+          </a:effectRef>
+          <a:fontRef idx="minor">
+            <a:schemeClr val="dk1"/>
+          </a:fontRef>
+        </p:style>
+      </p:cxnSp>
     </p:spTree>
     <p:extLst>
       <p:ext uri="{BB962C8B-B14F-4D97-AF65-F5344CB8AC3E}">
@@ -4299,6 +4928,1686 @@
     <p:extLst>
       <p:ext uri="{BB962C8B-B14F-4D97-AF65-F5344CB8AC3E}">
         <p14:creationId xmlns:p14="http://schemas.microsoft.com/office/powerpoint/2010/main" val="1891214027"/>
+      </p:ext>
+    </p:extLst>
+  </p:cSld>
+  <p:clrMapOvr>
+    <a:masterClrMapping/>
+  </p:clrMapOvr>
+</p:sld>
+</file>
+
+<file path=ppt/slides/slide4.xml><?xml version="1.0" encoding="utf-8"?>
+<p:sld xmlns:a="http://schemas.openxmlformats.org/drawingml/2006/main" xmlns:r="http://schemas.openxmlformats.org/officeDocument/2006/relationships" xmlns:p="http://schemas.openxmlformats.org/presentationml/2006/main">
+  <p:cSld>
+    <p:spTree>
+      <p:nvGrpSpPr>
+        <p:cNvPr id="1" name=""/>
+        <p:cNvGrpSpPr/>
+        <p:nvPr/>
+      </p:nvGrpSpPr>
+      <p:grpSpPr>
+        <a:xfrm>
+          <a:off x="0" y="0"/>
+          <a:ext cx="0" cy="0"/>
+          <a:chOff x="0" y="0"/>
+          <a:chExt cx="0" cy="0"/>
+        </a:xfrm>
+      </p:grpSpPr>
+      <p:sp>
+        <p:nvSpPr>
+          <p:cNvPr id="8" name="Rounded Rectangle 7"/>
+          <p:cNvSpPr/>
+          <p:nvPr/>
+        </p:nvSpPr>
+        <p:spPr>
+          <a:xfrm>
+            <a:off x="990600" y="2209800"/>
+            <a:ext cx="1371600" cy="731520"/>
+          </a:xfrm>
+          <a:prstGeom prst="roundRect">
+            <a:avLst/>
+          </a:prstGeom>
+        </p:spPr>
+        <p:style>
+          <a:lnRef idx="1">
+            <a:schemeClr val="dk1"/>
+          </a:lnRef>
+          <a:fillRef idx="2">
+            <a:schemeClr val="dk1"/>
+          </a:fillRef>
+          <a:effectRef idx="1">
+            <a:schemeClr val="dk1"/>
+          </a:effectRef>
+          <a:fontRef idx="minor">
+            <a:schemeClr val="dk1"/>
+          </a:fontRef>
+        </p:style>
+        <p:txBody>
+          <a:bodyPr rtlCol="0" anchor="ctr"/>
+          <a:lstStyle/>
+          <a:p>
+            <a:pPr algn="ctr"/>
+            <a:r>
+              <a:rPr lang="en-US" sz="1200" dirty="0"/>
+              <a:t>Modify the network structure and operations</a:t>
+            </a:r>
+          </a:p>
+        </p:txBody>
+      </p:sp>
+      <p:sp>
+        <p:nvSpPr>
+          <p:cNvPr id="9" name="Rounded Rectangle 8"/>
+          <p:cNvSpPr/>
+          <p:nvPr/>
+        </p:nvSpPr>
+        <p:spPr>
+          <a:xfrm>
+            <a:off x="990600" y="3810000"/>
+            <a:ext cx="1371600" cy="731520"/>
+          </a:xfrm>
+          <a:prstGeom prst="roundRect">
+            <a:avLst/>
+          </a:prstGeom>
+        </p:spPr>
+        <p:style>
+          <a:lnRef idx="1">
+            <a:schemeClr val="dk1"/>
+          </a:lnRef>
+          <a:fillRef idx="2">
+            <a:schemeClr val="dk1"/>
+          </a:fillRef>
+          <a:effectRef idx="1">
+            <a:schemeClr val="dk1"/>
+          </a:effectRef>
+          <a:fontRef idx="minor">
+            <a:schemeClr val="dk1"/>
+          </a:fontRef>
+        </p:style>
+        <p:txBody>
+          <a:bodyPr rtlCol="0" anchor="ctr"/>
+          <a:lstStyle/>
+          <a:p>
+            <a:pPr algn="ctr"/>
+            <a:r>
+              <a:rPr lang="en-US" sz="1200" dirty="0"/>
+              <a:t>Save the modified network as an EPANET INP file</a:t>
+            </a:r>
+          </a:p>
+        </p:txBody>
+      </p:sp>
+      <p:cxnSp>
+        <p:nvCxnSpPr>
+          <p:cNvPr id="12" name="Straight Arrow Connector 11"/>
+          <p:cNvCxnSpPr>
+            <a:stCxn id="8" idx="2"/>
+            <a:endCxn id="9" idx="0"/>
+          </p:cNvCxnSpPr>
+          <p:nvPr/>
+        </p:nvCxnSpPr>
+        <p:spPr>
+          <a:xfrm>
+            <a:off x="1676400" y="2941320"/>
+            <a:ext cx="0" cy="868680"/>
+          </a:xfrm>
+          <a:prstGeom prst="straightConnector1">
+            <a:avLst/>
+          </a:prstGeom>
+          <a:ln>
+            <a:tailEnd type="triangle"/>
+          </a:ln>
+        </p:spPr>
+        <p:style>
+          <a:lnRef idx="1">
+            <a:schemeClr val="dk1"/>
+          </a:lnRef>
+          <a:fillRef idx="0">
+            <a:schemeClr val="dk1"/>
+          </a:fillRef>
+          <a:effectRef idx="0">
+            <a:schemeClr val="dk1"/>
+          </a:effectRef>
+          <a:fontRef idx="minor">
+            <a:schemeClr val="tx1"/>
+          </a:fontRef>
+        </p:style>
+      </p:cxnSp>
+      <p:sp>
+        <p:nvSpPr>
+          <p:cNvPr id="17" name="Rounded Rectangle 16"/>
+          <p:cNvSpPr/>
+          <p:nvPr/>
+        </p:nvSpPr>
+        <p:spPr>
+          <a:xfrm>
+            <a:off x="2514600" y="1447800"/>
+            <a:ext cx="1188720" cy="640080"/>
+          </a:xfrm>
+          <a:prstGeom prst="roundRect">
+            <a:avLst/>
+          </a:prstGeom>
+        </p:spPr>
+        <p:style>
+          <a:lnRef idx="1">
+            <a:schemeClr val="dk1"/>
+          </a:lnRef>
+          <a:fillRef idx="2">
+            <a:schemeClr val="dk1"/>
+          </a:fillRef>
+          <a:effectRef idx="1">
+            <a:schemeClr val="dk1"/>
+          </a:effectRef>
+          <a:fontRef idx="minor">
+            <a:schemeClr val="dk1"/>
+          </a:fontRef>
+        </p:style>
+        <p:txBody>
+          <a:bodyPr rtlCol="0" anchor="ctr"/>
+          <a:lstStyle/>
+          <a:p>
+            <a:pPr algn="ctr"/>
+            <a:r>
+              <a:rPr lang="en-US" sz="1200" dirty="0"/>
+              <a:t>Compute topographic metrics</a:t>
+            </a:r>
+          </a:p>
+        </p:txBody>
+      </p:sp>
+      <p:sp>
+        <p:nvSpPr>
+          <p:cNvPr id="18" name="Rounded Rectangle 17"/>
+          <p:cNvSpPr/>
+          <p:nvPr/>
+        </p:nvSpPr>
+        <p:spPr>
+          <a:xfrm>
+            <a:off x="3383280" y="423509"/>
+            <a:ext cx="1371600" cy="640080"/>
+          </a:xfrm>
+          <a:prstGeom prst="roundRect">
+            <a:avLst/>
+          </a:prstGeom>
+        </p:spPr>
+        <p:style>
+          <a:lnRef idx="1">
+            <a:schemeClr val="dk1"/>
+          </a:lnRef>
+          <a:fillRef idx="2">
+            <a:schemeClr val="dk1"/>
+          </a:fillRef>
+          <a:effectRef idx="1">
+            <a:schemeClr val="dk1"/>
+          </a:effectRef>
+          <a:fontRef idx="minor">
+            <a:schemeClr val="dk1"/>
+          </a:fontRef>
+        </p:style>
+        <p:txBody>
+          <a:bodyPr rtlCol="0" anchor="ctr"/>
+          <a:lstStyle/>
+          <a:p>
+            <a:pPr algn="ctr"/>
+            <a:r>
+              <a:rPr lang="en-US" sz="1200" b="1" dirty="0"/>
+              <a:t>START</a:t>
+            </a:r>
+          </a:p>
+          <a:p>
+            <a:pPr algn="ctr"/>
+            <a:r>
+              <a:rPr lang="en-US" sz="1200" dirty="0"/>
+              <a:t>Generate a water network model</a:t>
+            </a:r>
+          </a:p>
+        </p:txBody>
+      </p:sp>
+      <p:sp>
+        <p:nvSpPr>
+          <p:cNvPr id="19" name="Rounded Rectangle 18"/>
+          <p:cNvSpPr/>
+          <p:nvPr/>
+        </p:nvSpPr>
+        <p:spPr>
+          <a:xfrm>
+            <a:off x="2514600" y="3032760"/>
+            <a:ext cx="1188720" cy="640080"/>
+          </a:xfrm>
+          <a:prstGeom prst="roundRect">
+            <a:avLst/>
+          </a:prstGeom>
+        </p:spPr>
+        <p:style>
+          <a:lnRef idx="1">
+            <a:schemeClr val="dk1"/>
+          </a:lnRef>
+          <a:fillRef idx="2">
+            <a:schemeClr val="dk1"/>
+          </a:fillRef>
+          <a:effectRef idx="1">
+            <a:schemeClr val="dk1"/>
+          </a:effectRef>
+          <a:fontRef idx="minor">
+            <a:schemeClr val="dk1"/>
+          </a:fontRef>
+        </p:style>
+        <p:txBody>
+          <a:bodyPr rtlCol="0" anchor="ctr"/>
+          <a:lstStyle/>
+          <a:p>
+            <a:pPr algn="ctr"/>
+            <a:r>
+              <a:rPr lang="en-US" sz="1200" dirty="0"/>
+              <a:t>Modify the network structure</a:t>
+            </a:r>
+          </a:p>
+        </p:txBody>
+      </p:sp>
+      <p:sp>
+        <p:nvSpPr>
+          <p:cNvPr id="20" name="Rounded Rectangle 19"/>
+          <p:cNvSpPr/>
+          <p:nvPr/>
+        </p:nvSpPr>
+        <p:spPr>
+          <a:xfrm>
+            <a:off x="2514600" y="4617720"/>
+            <a:ext cx="1188720" cy="640080"/>
+          </a:xfrm>
+          <a:prstGeom prst="roundRect">
+            <a:avLst/>
+          </a:prstGeom>
+        </p:spPr>
+        <p:style>
+          <a:lnRef idx="1">
+            <a:schemeClr val="dk1"/>
+          </a:lnRef>
+          <a:fillRef idx="2">
+            <a:schemeClr val="dk1"/>
+          </a:fillRef>
+          <a:effectRef idx="1">
+            <a:schemeClr val="dk1"/>
+          </a:effectRef>
+          <a:fontRef idx="minor">
+            <a:schemeClr val="dk1"/>
+          </a:fontRef>
+        </p:style>
+        <p:txBody>
+          <a:bodyPr rtlCol="0" anchor="ctr"/>
+          <a:lstStyle/>
+          <a:p>
+            <a:pPr algn="ctr"/>
+            <a:r>
+              <a:rPr lang="en-US" sz="1200" dirty="0" err="1"/>
+              <a:t>Recompute</a:t>
+            </a:r>
+            <a:r>
+              <a:rPr lang="en-US" sz="1200" dirty="0"/>
+              <a:t> topographic metrics</a:t>
+            </a:r>
+          </a:p>
+        </p:txBody>
+      </p:sp>
+      <p:sp>
+        <p:nvSpPr>
+          <p:cNvPr id="21" name="Rounded Rectangle 20"/>
+          <p:cNvSpPr/>
+          <p:nvPr/>
+        </p:nvSpPr>
+        <p:spPr>
+          <a:xfrm>
+            <a:off x="3383280" y="6023841"/>
+            <a:ext cx="1463040" cy="640080"/>
+          </a:xfrm>
+          <a:prstGeom prst="roundRect">
+            <a:avLst/>
+          </a:prstGeom>
+        </p:spPr>
+        <p:style>
+          <a:lnRef idx="1">
+            <a:schemeClr val="dk1"/>
+          </a:lnRef>
+          <a:fillRef idx="2">
+            <a:schemeClr val="dk1"/>
+          </a:fillRef>
+          <a:effectRef idx="1">
+            <a:schemeClr val="dk1"/>
+          </a:effectRef>
+          <a:fontRef idx="minor">
+            <a:schemeClr val="dk1"/>
+          </a:fontRef>
+        </p:style>
+        <p:txBody>
+          <a:bodyPr rtlCol="0" anchor="ctr"/>
+          <a:lstStyle/>
+          <a:p>
+            <a:pPr algn="ctr"/>
+            <a:r>
+              <a:rPr lang="en-US" sz="1200" b="1" dirty="0"/>
+              <a:t>END</a:t>
+            </a:r>
+          </a:p>
+          <a:p>
+            <a:pPr algn="ctr"/>
+            <a:r>
+              <a:rPr lang="en-US" sz="1200" dirty="0"/>
+              <a:t>Analyze results and generate graphics</a:t>
+            </a:r>
+          </a:p>
+        </p:txBody>
+      </p:sp>
+      <p:sp>
+        <p:nvSpPr>
+          <p:cNvPr id="22" name="Rounded Rectangle 21"/>
+          <p:cNvSpPr/>
+          <p:nvPr/>
+        </p:nvSpPr>
+        <p:spPr>
+          <a:xfrm>
+            <a:off x="4208756" y="1295400"/>
+            <a:ext cx="1645920" cy="731520"/>
+          </a:xfrm>
+          <a:prstGeom prst="roundRect">
+            <a:avLst/>
+          </a:prstGeom>
+        </p:spPr>
+        <p:style>
+          <a:lnRef idx="1">
+            <a:schemeClr val="dk1"/>
+          </a:lnRef>
+          <a:fillRef idx="2">
+            <a:schemeClr val="dk1"/>
+          </a:fillRef>
+          <a:effectRef idx="1">
+            <a:schemeClr val="dk1"/>
+          </a:effectRef>
+          <a:fontRef idx="minor">
+            <a:schemeClr val="dk1"/>
+          </a:fontRef>
+        </p:style>
+        <p:txBody>
+          <a:bodyPr rtlCol="0" anchor="ctr"/>
+          <a:lstStyle/>
+          <a:p>
+            <a:pPr algn="ctr"/>
+            <a:r>
+              <a:rPr lang="en-US" sz="1200" dirty="0"/>
+              <a:t>Run a hydraulic and water quality simulation</a:t>
+            </a:r>
+          </a:p>
+        </p:txBody>
+      </p:sp>
+      <p:sp>
+        <p:nvSpPr>
+          <p:cNvPr id="24" name="Rounded Rectangle 23"/>
+          <p:cNvSpPr/>
+          <p:nvPr/>
+        </p:nvSpPr>
+        <p:spPr>
+          <a:xfrm>
+            <a:off x="4208756" y="2312351"/>
+            <a:ext cx="1645920" cy="548640"/>
+          </a:xfrm>
+          <a:prstGeom prst="roundRect">
+            <a:avLst/>
+          </a:prstGeom>
+        </p:spPr>
+        <p:style>
+          <a:lnRef idx="1">
+            <a:schemeClr val="dk1"/>
+          </a:lnRef>
+          <a:fillRef idx="2">
+            <a:schemeClr val="dk1"/>
+          </a:fillRef>
+          <a:effectRef idx="1">
+            <a:schemeClr val="dk1"/>
+          </a:effectRef>
+          <a:fontRef idx="minor">
+            <a:schemeClr val="dk1"/>
+          </a:fontRef>
+        </p:style>
+        <p:txBody>
+          <a:bodyPr rtlCol="0" anchor="ctr"/>
+          <a:lstStyle/>
+          <a:p>
+            <a:pPr algn="ctr"/>
+            <a:r>
+              <a:rPr lang="en-US" sz="1200" dirty="0"/>
+              <a:t>Compute resilience metrics</a:t>
+            </a:r>
+          </a:p>
+        </p:txBody>
+      </p:sp>
+      <p:sp>
+        <p:nvSpPr>
+          <p:cNvPr id="25" name="Rounded Rectangle 24"/>
+          <p:cNvSpPr/>
+          <p:nvPr/>
+        </p:nvSpPr>
+        <p:spPr>
+          <a:xfrm>
+            <a:off x="4208756" y="3146421"/>
+            <a:ext cx="1645920" cy="822960"/>
+          </a:xfrm>
+          <a:prstGeom prst="roundRect">
+            <a:avLst/>
+          </a:prstGeom>
+        </p:spPr>
+        <p:style>
+          <a:lnRef idx="1">
+            <a:schemeClr val="dk1"/>
+          </a:lnRef>
+          <a:fillRef idx="2">
+            <a:schemeClr val="dk1"/>
+          </a:fillRef>
+          <a:effectRef idx="1">
+            <a:schemeClr val="dk1"/>
+          </a:effectRef>
+          <a:fontRef idx="minor">
+            <a:schemeClr val="dk1"/>
+          </a:fontRef>
+        </p:style>
+        <p:txBody>
+          <a:bodyPr rtlCol="0" anchor="ctr"/>
+          <a:lstStyle/>
+          <a:p>
+            <a:pPr algn="ctr"/>
+            <a:r>
+              <a:rPr lang="en-US" sz="1200" dirty="0"/>
+              <a:t>Add a disruptive incident and recovery action based on historical data</a:t>
+            </a:r>
+          </a:p>
+        </p:txBody>
+      </p:sp>
+      <p:sp>
+        <p:nvSpPr>
+          <p:cNvPr id="26" name="Rounded Rectangle 25"/>
+          <p:cNvSpPr/>
+          <p:nvPr/>
+        </p:nvSpPr>
+        <p:spPr>
+          <a:xfrm>
+            <a:off x="4208756" y="4254811"/>
+            <a:ext cx="1645920" cy="640080"/>
+          </a:xfrm>
+          <a:prstGeom prst="roundRect">
+            <a:avLst/>
+          </a:prstGeom>
+        </p:spPr>
+        <p:style>
+          <a:lnRef idx="1">
+            <a:schemeClr val="dk1"/>
+          </a:lnRef>
+          <a:fillRef idx="2">
+            <a:schemeClr val="dk1"/>
+          </a:fillRef>
+          <a:effectRef idx="1">
+            <a:schemeClr val="dk1"/>
+          </a:effectRef>
+          <a:fontRef idx="minor">
+            <a:schemeClr val="dk1"/>
+          </a:fontRef>
+        </p:style>
+        <p:txBody>
+          <a:bodyPr rtlCol="0" anchor="ctr"/>
+          <a:lstStyle/>
+          <a:p>
+            <a:pPr algn="ctr"/>
+            <a:r>
+              <a:rPr lang="en-US" sz="1200" dirty="0"/>
+              <a:t>Rerun the hydraulic and water quality simulation</a:t>
+            </a:r>
+          </a:p>
+        </p:txBody>
+      </p:sp>
+      <p:sp>
+        <p:nvSpPr>
+          <p:cNvPr id="27" name="Rounded Rectangle 26"/>
+          <p:cNvSpPr/>
+          <p:nvPr/>
+        </p:nvSpPr>
+        <p:spPr>
+          <a:xfrm>
+            <a:off x="4208756" y="5180322"/>
+            <a:ext cx="1645920" cy="548640"/>
+          </a:xfrm>
+          <a:prstGeom prst="roundRect">
+            <a:avLst/>
+          </a:prstGeom>
+        </p:spPr>
+        <p:style>
+          <a:lnRef idx="1">
+            <a:schemeClr val="dk1"/>
+          </a:lnRef>
+          <a:fillRef idx="2">
+            <a:schemeClr val="dk1"/>
+          </a:fillRef>
+          <a:effectRef idx="1">
+            <a:schemeClr val="dk1"/>
+          </a:effectRef>
+          <a:fontRef idx="minor">
+            <a:schemeClr val="dk1"/>
+          </a:fontRef>
+        </p:style>
+        <p:txBody>
+          <a:bodyPr rtlCol="0" anchor="ctr"/>
+          <a:lstStyle/>
+          <a:p>
+            <a:pPr algn="ctr"/>
+            <a:r>
+              <a:rPr lang="en-US" sz="1200" dirty="0" err="1"/>
+              <a:t>Recompute</a:t>
+            </a:r>
+            <a:r>
+              <a:rPr lang="en-US" sz="1200" dirty="0"/>
+              <a:t> resilience metrics</a:t>
+            </a:r>
+          </a:p>
+        </p:txBody>
+      </p:sp>
+      <p:cxnSp>
+        <p:nvCxnSpPr>
+          <p:cNvPr id="31" name="Elbow Connector 30"/>
+          <p:cNvCxnSpPr>
+            <a:stCxn id="18" idx="1"/>
+            <a:endCxn id="8" idx="0"/>
+          </p:cNvCxnSpPr>
+          <p:nvPr/>
+        </p:nvCxnSpPr>
+        <p:spPr>
+          <a:xfrm rot="10800000" flipV="1">
+            <a:off x="1676400" y="743548"/>
+            <a:ext cx="1706880" cy="1466251"/>
+          </a:xfrm>
+          <a:prstGeom prst="bentConnector2">
+            <a:avLst/>
+          </a:prstGeom>
+          <a:ln>
+            <a:tailEnd type="triangle"/>
+          </a:ln>
+        </p:spPr>
+        <p:style>
+          <a:lnRef idx="1">
+            <a:schemeClr val="dk1"/>
+          </a:lnRef>
+          <a:fillRef idx="0">
+            <a:schemeClr val="dk1"/>
+          </a:fillRef>
+          <a:effectRef idx="0">
+            <a:schemeClr val="dk1"/>
+          </a:effectRef>
+          <a:fontRef idx="minor">
+            <a:schemeClr val="tx1"/>
+          </a:fontRef>
+        </p:style>
+      </p:cxnSp>
+      <p:cxnSp>
+        <p:nvCxnSpPr>
+          <p:cNvPr id="33" name="Elbow Connector 32"/>
+          <p:cNvCxnSpPr>
+            <a:stCxn id="9" idx="2"/>
+            <a:endCxn id="21" idx="1"/>
+          </p:cNvCxnSpPr>
+          <p:nvPr/>
+        </p:nvCxnSpPr>
+        <p:spPr>
+          <a:xfrm rot="16200000" flipH="1">
+            <a:off x="1628660" y="4589260"/>
+            <a:ext cx="1802361" cy="1706880"/>
+          </a:xfrm>
+          <a:prstGeom prst="bentConnector2">
+            <a:avLst/>
+          </a:prstGeom>
+          <a:ln>
+            <a:tailEnd type="triangle"/>
+          </a:ln>
+        </p:spPr>
+        <p:style>
+          <a:lnRef idx="1">
+            <a:schemeClr val="dk1"/>
+          </a:lnRef>
+          <a:fillRef idx="0">
+            <a:schemeClr val="dk1"/>
+          </a:fillRef>
+          <a:effectRef idx="0">
+            <a:schemeClr val="dk1"/>
+          </a:effectRef>
+          <a:fontRef idx="minor">
+            <a:schemeClr val="tx1"/>
+          </a:fontRef>
+        </p:style>
+      </p:cxnSp>
+      <p:cxnSp>
+        <p:nvCxnSpPr>
+          <p:cNvPr id="54" name="Elbow Connector 53"/>
+          <p:cNvCxnSpPr>
+            <a:stCxn id="18" idx="1"/>
+            <a:endCxn id="17" idx="0"/>
+          </p:cNvCxnSpPr>
+          <p:nvPr/>
+        </p:nvCxnSpPr>
+        <p:spPr>
+          <a:xfrm rot="10800000" flipV="1">
+            <a:off x="3108960" y="743548"/>
+            <a:ext cx="274320" cy="704251"/>
+          </a:xfrm>
+          <a:prstGeom prst="bentConnector2">
+            <a:avLst/>
+          </a:prstGeom>
+          <a:ln>
+            <a:tailEnd type="triangle"/>
+          </a:ln>
+        </p:spPr>
+        <p:style>
+          <a:lnRef idx="1">
+            <a:schemeClr val="dk1"/>
+          </a:lnRef>
+          <a:fillRef idx="0">
+            <a:schemeClr val="dk1"/>
+          </a:fillRef>
+          <a:effectRef idx="0">
+            <a:schemeClr val="dk1"/>
+          </a:effectRef>
+          <a:fontRef idx="minor">
+            <a:schemeClr val="tx1"/>
+          </a:fontRef>
+        </p:style>
+      </p:cxnSp>
+      <p:cxnSp>
+        <p:nvCxnSpPr>
+          <p:cNvPr id="59" name="Straight Arrow Connector 58"/>
+          <p:cNvCxnSpPr>
+            <a:stCxn id="17" idx="2"/>
+            <a:endCxn id="19" idx="0"/>
+          </p:cNvCxnSpPr>
+          <p:nvPr/>
+        </p:nvCxnSpPr>
+        <p:spPr>
+          <a:xfrm>
+            <a:off x="3108960" y="2087880"/>
+            <a:ext cx="0" cy="944880"/>
+          </a:xfrm>
+          <a:prstGeom prst="straightConnector1">
+            <a:avLst/>
+          </a:prstGeom>
+          <a:ln>
+            <a:tailEnd type="triangle"/>
+          </a:ln>
+        </p:spPr>
+        <p:style>
+          <a:lnRef idx="1">
+            <a:schemeClr val="dk1"/>
+          </a:lnRef>
+          <a:fillRef idx="0">
+            <a:schemeClr val="dk1"/>
+          </a:fillRef>
+          <a:effectRef idx="0">
+            <a:schemeClr val="dk1"/>
+          </a:effectRef>
+          <a:fontRef idx="minor">
+            <a:schemeClr val="tx1"/>
+          </a:fontRef>
+        </p:style>
+      </p:cxnSp>
+      <p:cxnSp>
+        <p:nvCxnSpPr>
+          <p:cNvPr id="62" name="Straight Arrow Connector 61"/>
+          <p:cNvCxnSpPr>
+            <a:stCxn id="19" idx="2"/>
+            <a:endCxn id="20" idx="0"/>
+          </p:cNvCxnSpPr>
+          <p:nvPr/>
+        </p:nvCxnSpPr>
+        <p:spPr>
+          <a:xfrm>
+            <a:off x="3108960" y="3672840"/>
+            <a:ext cx="0" cy="944880"/>
+          </a:xfrm>
+          <a:prstGeom prst="straightConnector1">
+            <a:avLst/>
+          </a:prstGeom>
+          <a:ln>
+            <a:tailEnd type="triangle"/>
+          </a:ln>
+        </p:spPr>
+        <p:style>
+          <a:lnRef idx="1">
+            <a:schemeClr val="dk1"/>
+          </a:lnRef>
+          <a:fillRef idx="0">
+            <a:schemeClr val="dk1"/>
+          </a:fillRef>
+          <a:effectRef idx="0">
+            <a:schemeClr val="dk1"/>
+          </a:effectRef>
+          <a:fontRef idx="minor">
+            <a:schemeClr val="tx1"/>
+          </a:fontRef>
+        </p:style>
+      </p:cxnSp>
+      <p:sp>
+        <p:nvSpPr>
+          <p:cNvPr id="70" name="Rounded Rectangle 69"/>
+          <p:cNvSpPr/>
+          <p:nvPr/>
+        </p:nvSpPr>
+        <p:spPr>
+          <a:xfrm>
+            <a:off x="6172200" y="1051560"/>
+            <a:ext cx="1645920" cy="1005840"/>
+          </a:xfrm>
+          <a:prstGeom prst="roundRect">
+            <a:avLst/>
+          </a:prstGeom>
+        </p:spPr>
+        <p:style>
+          <a:lnRef idx="1">
+            <a:schemeClr val="dk1"/>
+          </a:lnRef>
+          <a:fillRef idx="2">
+            <a:schemeClr val="dk1"/>
+          </a:fillRef>
+          <a:effectRef idx="1">
+            <a:schemeClr val="dk1"/>
+          </a:effectRef>
+          <a:fontRef idx="minor">
+            <a:schemeClr val="dk1"/>
+          </a:fontRef>
+        </p:style>
+        <p:txBody>
+          <a:bodyPr rtlCol="0" anchor="ctr"/>
+          <a:lstStyle/>
+          <a:p>
+            <a:pPr algn="ctr"/>
+            <a:r>
+              <a:rPr lang="en-US" sz="1200" dirty="0"/>
+              <a:t>Define fragility curves for failure and available resources for recovery</a:t>
+            </a:r>
+          </a:p>
+        </p:txBody>
+      </p:sp>
+      <p:sp>
+        <p:nvSpPr>
+          <p:cNvPr id="71" name="Rounded Rectangle 70"/>
+          <p:cNvSpPr/>
+          <p:nvPr/>
+        </p:nvSpPr>
+        <p:spPr>
+          <a:xfrm>
+            <a:off x="6172200" y="2339340"/>
+            <a:ext cx="1645920" cy="731520"/>
+          </a:xfrm>
+          <a:prstGeom prst="roundRect">
+            <a:avLst/>
+          </a:prstGeom>
+        </p:spPr>
+        <p:style>
+          <a:lnRef idx="1">
+            <a:schemeClr val="dk1"/>
+          </a:lnRef>
+          <a:fillRef idx="2">
+            <a:schemeClr val="dk1"/>
+          </a:fillRef>
+          <a:effectRef idx="1">
+            <a:schemeClr val="dk1"/>
+          </a:effectRef>
+          <a:fontRef idx="minor">
+            <a:schemeClr val="dk1"/>
+          </a:fontRef>
+        </p:style>
+        <p:txBody>
+          <a:bodyPr rtlCol="0" anchor="ctr"/>
+          <a:lstStyle/>
+          <a:p>
+            <a:pPr algn="ctr"/>
+            <a:r>
+              <a:rPr lang="en-US" sz="1200" dirty="0"/>
+              <a:t>Simulate environmental change from a disaster</a:t>
+            </a:r>
+          </a:p>
+        </p:txBody>
+      </p:sp>
+      <p:sp>
+        <p:nvSpPr>
+          <p:cNvPr id="72" name="Rounded Rectangle 71"/>
+          <p:cNvSpPr/>
+          <p:nvPr/>
+        </p:nvSpPr>
+        <p:spPr>
+          <a:xfrm>
+            <a:off x="6172200" y="3352800"/>
+            <a:ext cx="1645920" cy="1005840"/>
+          </a:xfrm>
+          <a:prstGeom prst="roundRect">
+            <a:avLst/>
+          </a:prstGeom>
+        </p:spPr>
+        <p:style>
+          <a:lnRef idx="1">
+            <a:schemeClr val="dk1"/>
+          </a:lnRef>
+          <a:fillRef idx="2">
+            <a:schemeClr val="dk1"/>
+          </a:fillRef>
+          <a:effectRef idx="1">
+            <a:schemeClr val="dk1"/>
+          </a:effectRef>
+          <a:fontRef idx="minor">
+            <a:schemeClr val="dk1"/>
+          </a:fontRef>
+        </p:style>
+        <p:txBody>
+          <a:bodyPr rtlCol="0" anchor="ctr"/>
+          <a:lstStyle/>
+          <a:p>
+            <a:pPr algn="ctr"/>
+            <a:r>
+              <a:rPr lang="en-US" sz="1200" dirty="0"/>
+              <a:t>Add a disruptive incident and recovery action based fragility curves and available resources</a:t>
+            </a:r>
+          </a:p>
+        </p:txBody>
+      </p:sp>
+      <p:sp>
+        <p:nvSpPr>
+          <p:cNvPr id="73" name="Rounded Rectangle 72"/>
+          <p:cNvSpPr/>
+          <p:nvPr/>
+        </p:nvSpPr>
+        <p:spPr>
+          <a:xfrm>
+            <a:off x="6172200" y="4640580"/>
+            <a:ext cx="1645920" cy="640080"/>
+          </a:xfrm>
+          <a:prstGeom prst="roundRect">
+            <a:avLst/>
+          </a:prstGeom>
+        </p:spPr>
+        <p:style>
+          <a:lnRef idx="1">
+            <a:schemeClr val="dk1"/>
+          </a:lnRef>
+          <a:fillRef idx="2">
+            <a:schemeClr val="dk1"/>
+          </a:fillRef>
+          <a:effectRef idx="1">
+            <a:schemeClr val="dk1"/>
+          </a:effectRef>
+          <a:fontRef idx="minor">
+            <a:schemeClr val="dk1"/>
+          </a:fontRef>
+        </p:style>
+        <p:txBody>
+          <a:bodyPr rtlCol="0" anchor="ctr"/>
+          <a:lstStyle/>
+          <a:p>
+            <a:pPr algn="ctr"/>
+            <a:r>
+              <a:rPr lang="en-US" sz="1200" dirty="0"/>
+              <a:t>Run a hydraulic and water quality simulation</a:t>
+            </a:r>
+          </a:p>
+        </p:txBody>
+      </p:sp>
+      <p:sp>
+        <p:nvSpPr>
+          <p:cNvPr id="74" name="Rounded Rectangle 73"/>
+          <p:cNvSpPr/>
+          <p:nvPr/>
+        </p:nvSpPr>
+        <p:spPr>
+          <a:xfrm>
+            <a:off x="6172200" y="5562600"/>
+            <a:ext cx="1645920" cy="457200"/>
+          </a:xfrm>
+          <a:prstGeom prst="roundRect">
+            <a:avLst/>
+          </a:prstGeom>
+        </p:spPr>
+        <p:style>
+          <a:lnRef idx="1">
+            <a:schemeClr val="dk1"/>
+          </a:lnRef>
+          <a:fillRef idx="2">
+            <a:schemeClr val="dk1"/>
+          </a:fillRef>
+          <a:effectRef idx="1">
+            <a:schemeClr val="dk1"/>
+          </a:effectRef>
+          <a:fontRef idx="minor">
+            <a:schemeClr val="dk1"/>
+          </a:fontRef>
+        </p:style>
+        <p:txBody>
+          <a:bodyPr rtlCol="0" anchor="ctr"/>
+          <a:lstStyle/>
+          <a:p>
+            <a:pPr algn="ctr"/>
+            <a:r>
+              <a:rPr lang="en-US" sz="1200" dirty="0"/>
+              <a:t>Compute resilience metrics</a:t>
+            </a:r>
+          </a:p>
+        </p:txBody>
+      </p:sp>
+      <p:cxnSp>
+        <p:nvCxnSpPr>
+          <p:cNvPr id="76" name="Elbow Connector 75"/>
+          <p:cNvCxnSpPr>
+            <a:stCxn id="74" idx="3"/>
+            <a:endCxn id="71" idx="3"/>
+          </p:cNvCxnSpPr>
+          <p:nvPr/>
+        </p:nvCxnSpPr>
+        <p:spPr>
+          <a:xfrm flipV="1">
+            <a:off x="7818120" y="2705100"/>
+            <a:ext cx="12700" cy="3086100"/>
+          </a:xfrm>
+          <a:prstGeom prst="bentConnector3">
+            <a:avLst>
+              <a:gd name="adj1" fmla="val 1800000"/>
+            </a:avLst>
+          </a:prstGeom>
+          <a:ln>
+            <a:tailEnd type="triangle"/>
+          </a:ln>
+        </p:spPr>
+        <p:style>
+          <a:lnRef idx="1">
+            <a:schemeClr val="dk1"/>
+          </a:lnRef>
+          <a:fillRef idx="0">
+            <a:schemeClr val="dk1"/>
+          </a:fillRef>
+          <a:effectRef idx="0">
+            <a:schemeClr val="dk1"/>
+          </a:effectRef>
+          <a:fontRef idx="minor">
+            <a:schemeClr val="tx1"/>
+          </a:fontRef>
+        </p:style>
+      </p:cxnSp>
+      <p:cxnSp>
+        <p:nvCxnSpPr>
+          <p:cNvPr id="83" name="Elbow Connector 82"/>
+          <p:cNvCxnSpPr>
+            <a:stCxn id="20" idx="2"/>
+            <a:endCxn id="21" idx="1"/>
+          </p:cNvCxnSpPr>
+          <p:nvPr/>
+        </p:nvCxnSpPr>
+        <p:spPr>
+          <a:xfrm rot="16200000" flipH="1">
+            <a:off x="2703080" y="5663680"/>
+            <a:ext cx="1086081" cy="274320"/>
+          </a:xfrm>
+          <a:prstGeom prst="bentConnector2">
+            <a:avLst/>
+          </a:prstGeom>
+          <a:ln>
+            <a:tailEnd type="triangle"/>
+          </a:ln>
+        </p:spPr>
+        <p:style>
+          <a:lnRef idx="1">
+            <a:schemeClr val="dk1"/>
+          </a:lnRef>
+          <a:fillRef idx="0">
+            <a:schemeClr val="dk1"/>
+          </a:fillRef>
+          <a:effectRef idx="0">
+            <a:schemeClr val="dk1"/>
+          </a:effectRef>
+          <a:fontRef idx="minor">
+            <a:schemeClr val="tx1"/>
+          </a:fontRef>
+        </p:style>
+      </p:cxnSp>
+      <p:sp>
+        <p:nvSpPr>
+          <p:cNvPr id="85" name="TextBox 84"/>
+          <p:cNvSpPr txBox="1"/>
+          <p:nvPr/>
+        </p:nvSpPr>
+        <p:spPr>
+          <a:xfrm>
+            <a:off x="1285920" y="114390"/>
+            <a:ext cx="619080" cy="276999"/>
+          </a:xfrm>
+          <a:prstGeom prst="rect">
+            <a:avLst/>
+          </a:prstGeom>
+          <a:noFill/>
+        </p:spPr>
+        <p:txBody>
+          <a:bodyPr wrap="none" rtlCol="0">
+            <a:spAutoFit/>
+          </a:bodyPr>
+          <a:lstStyle/>
+          <a:p>
+            <a:r>
+              <a:rPr lang="en-US" sz="1200" b="1" dirty="0">
+                <a:solidFill>
+                  <a:schemeClr val="accent2"/>
+                </a:solidFill>
+              </a:rPr>
+              <a:t>Simple</a:t>
+            </a:r>
+          </a:p>
+        </p:txBody>
+      </p:sp>
+      <p:cxnSp>
+        <p:nvCxnSpPr>
+          <p:cNvPr id="87" name="Straight Arrow Connector 86"/>
+          <p:cNvCxnSpPr>
+            <a:stCxn id="85" idx="3"/>
+            <a:endCxn id="88" idx="1"/>
+          </p:cNvCxnSpPr>
+          <p:nvPr/>
+        </p:nvCxnSpPr>
+        <p:spPr>
+          <a:xfrm>
+            <a:off x="1905000" y="252890"/>
+            <a:ext cx="4800600" cy="0"/>
+          </a:xfrm>
+          <a:prstGeom prst="straightConnector1">
+            <a:avLst/>
+          </a:prstGeom>
+          <a:ln>
+            <a:tailEnd type="triangle"/>
+          </a:ln>
+        </p:spPr>
+        <p:style>
+          <a:lnRef idx="1">
+            <a:schemeClr val="accent2"/>
+          </a:lnRef>
+          <a:fillRef idx="0">
+            <a:schemeClr val="accent2"/>
+          </a:fillRef>
+          <a:effectRef idx="0">
+            <a:schemeClr val="accent2"/>
+          </a:effectRef>
+          <a:fontRef idx="minor">
+            <a:schemeClr val="tx1"/>
+          </a:fontRef>
+        </p:style>
+      </p:cxnSp>
+      <p:sp>
+        <p:nvSpPr>
+          <p:cNvPr id="88" name="TextBox 87"/>
+          <p:cNvSpPr txBox="1"/>
+          <p:nvPr/>
+        </p:nvSpPr>
+        <p:spPr>
+          <a:xfrm>
+            <a:off x="6705600" y="114390"/>
+            <a:ext cx="741678" cy="276999"/>
+          </a:xfrm>
+          <a:prstGeom prst="rect">
+            <a:avLst/>
+          </a:prstGeom>
+          <a:noFill/>
+        </p:spPr>
+        <p:txBody>
+          <a:bodyPr wrap="none" rtlCol="0">
+            <a:spAutoFit/>
+          </a:bodyPr>
+          <a:lstStyle/>
+          <a:p>
+            <a:r>
+              <a:rPr lang="en-US" sz="1200" b="1" dirty="0">
+                <a:solidFill>
+                  <a:schemeClr val="accent2"/>
+                </a:solidFill>
+              </a:rPr>
+              <a:t>Complex</a:t>
+            </a:r>
+          </a:p>
+        </p:txBody>
+      </p:sp>
+      <p:cxnSp>
+        <p:nvCxnSpPr>
+          <p:cNvPr id="104" name="Elbow Connector 103"/>
+          <p:cNvCxnSpPr>
+            <a:stCxn id="74" idx="2"/>
+            <a:endCxn id="21" idx="3"/>
+          </p:cNvCxnSpPr>
+          <p:nvPr/>
+        </p:nvCxnSpPr>
+        <p:spPr>
+          <a:xfrm rot="5400000">
+            <a:off x="5758700" y="5107420"/>
+            <a:ext cx="324081" cy="2148840"/>
+          </a:xfrm>
+          <a:prstGeom prst="bentConnector2">
+            <a:avLst/>
+          </a:prstGeom>
+          <a:ln>
+            <a:tailEnd type="triangle"/>
+          </a:ln>
+        </p:spPr>
+        <p:style>
+          <a:lnRef idx="1">
+            <a:schemeClr val="dk1"/>
+          </a:lnRef>
+          <a:fillRef idx="0">
+            <a:schemeClr val="dk1"/>
+          </a:fillRef>
+          <a:effectRef idx="0">
+            <a:schemeClr val="dk1"/>
+          </a:effectRef>
+          <a:fontRef idx="minor">
+            <a:schemeClr val="tx1"/>
+          </a:fontRef>
+        </p:style>
+      </p:cxnSp>
+      <p:cxnSp>
+        <p:nvCxnSpPr>
+          <p:cNvPr id="109" name="Elbow Connector 108"/>
+          <p:cNvCxnSpPr>
+            <a:stCxn id="18" idx="3"/>
+            <a:endCxn id="70" idx="0"/>
+          </p:cNvCxnSpPr>
+          <p:nvPr/>
+        </p:nvCxnSpPr>
+        <p:spPr>
+          <a:xfrm>
+            <a:off x="4754880" y="743549"/>
+            <a:ext cx="2240280" cy="308011"/>
+          </a:xfrm>
+          <a:prstGeom prst="bentConnector2">
+            <a:avLst/>
+          </a:prstGeom>
+          <a:ln>
+            <a:tailEnd type="triangle"/>
+          </a:ln>
+        </p:spPr>
+        <p:style>
+          <a:lnRef idx="1">
+            <a:schemeClr val="dk1"/>
+          </a:lnRef>
+          <a:fillRef idx="0">
+            <a:schemeClr val="dk1"/>
+          </a:fillRef>
+          <a:effectRef idx="0">
+            <a:schemeClr val="dk1"/>
+          </a:effectRef>
+          <a:fontRef idx="minor">
+            <a:schemeClr val="tx1"/>
+          </a:fontRef>
+        </p:style>
+      </p:cxnSp>
+      <p:cxnSp>
+        <p:nvCxnSpPr>
+          <p:cNvPr id="110" name="Elbow Connector 109"/>
+          <p:cNvCxnSpPr>
+            <a:stCxn id="18" idx="3"/>
+            <a:endCxn id="22" idx="0"/>
+          </p:cNvCxnSpPr>
+          <p:nvPr/>
+        </p:nvCxnSpPr>
+        <p:spPr>
+          <a:xfrm>
+            <a:off x="4754880" y="743549"/>
+            <a:ext cx="276836" cy="551851"/>
+          </a:xfrm>
+          <a:prstGeom prst="bentConnector2">
+            <a:avLst/>
+          </a:prstGeom>
+          <a:ln>
+            <a:tailEnd type="triangle"/>
+          </a:ln>
+        </p:spPr>
+        <p:style>
+          <a:lnRef idx="1">
+            <a:schemeClr val="dk1"/>
+          </a:lnRef>
+          <a:fillRef idx="0">
+            <a:schemeClr val="dk1"/>
+          </a:fillRef>
+          <a:effectRef idx="0">
+            <a:schemeClr val="dk1"/>
+          </a:effectRef>
+          <a:fontRef idx="minor">
+            <a:schemeClr val="tx1"/>
+          </a:fontRef>
+        </p:style>
+      </p:cxnSp>
+      <p:sp>
+        <p:nvSpPr>
+          <p:cNvPr id="125" name="TextBox 124"/>
+          <p:cNvSpPr txBox="1"/>
+          <p:nvPr/>
+        </p:nvSpPr>
+        <p:spPr>
+          <a:xfrm rot="16200000">
+            <a:off x="7102301" y="3956131"/>
+            <a:ext cx="2221442" cy="276999"/>
+          </a:xfrm>
+          <a:prstGeom prst="rect">
+            <a:avLst/>
+          </a:prstGeom>
+          <a:noFill/>
+        </p:spPr>
+        <p:txBody>
+          <a:bodyPr wrap="none" rtlCol="0">
+            <a:spAutoFit/>
+          </a:bodyPr>
+          <a:lstStyle/>
+          <a:p>
+            <a:r>
+              <a:rPr lang="en-US" sz="1200" dirty="0"/>
+              <a:t>For multiple stochastic scenarios</a:t>
+            </a:r>
+          </a:p>
+        </p:txBody>
+      </p:sp>
+      <p:cxnSp>
+        <p:nvCxnSpPr>
+          <p:cNvPr id="130" name="Elbow Connector 129"/>
+          <p:cNvCxnSpPr>
+            <a:stCxn id="27" idx="2"/>
+            <a:endCxn id="21" idx="3"/>
+          </p:cNvCxnSpPr>
+          <p:nvPr/>
+        </p:nvCxnSpPr>
+        <p:spPr>
+          <a:xfrm rot="5400000">
+            <a:off x="4631559" y="5943723"/>
+            <a:ext cx="614919" cy="185396"/>
+          </a:xfrm>
+          <a:prstGeom prst="bentConnector2">
+            <a:avLst/>
+          </a:prstGeom>
+          <a:ln>
+            <a:tailEnd type="triangle"/>
+          </a:ln>
+        </p:spPr>
+        <p:style>
+          <a:lnRef idx="1">
+            <a:schemeClr val="dk1"/>
+          </a:lnRef>
+          <a:fillRef idx="0">
+            <a:schemeClr val="dk1"/>
+          </a:fillRef>
+          <a:effectRef idx="0">
+            <a:schemeClr val="dk1"/>
+          </a:effectRef>
+          <a:fontRef idx="minor">
+            <a:schemeClr val="tx1"/>
+          </a:fontRef>
+        </p:style>
+      </p:cxnSp>
+      <p:cxnSp>
+        <p:nvCxnSpPr>
+          <p:cNvPr id="133" name="Straight Arrow Connector 132"/>
+          <p:cNvCxnSpPr>
+            <a:stCxn id="22" idx="2"/>
+            <a:endCxn id="24" idx="0"/>
+          </p:cNvCxnSpPr>
+          <p:nvPr/>
+        </p:nvCxnSpPr>
+        <p:spPr>
+          <a:xfrm>
+            <a:off x="5031716" y="2026920"/>
+            <a:ext cx="0" cy="285431"/>
+          </a:xfrm>
+          <a:prstGeom prst="straightConnector1">
+            <a:avLst/>
+          </a:prstGeom>
+          <a:ln>
+            <a:tailEnd type="triangle"/>
+          </a:ln>
+        </p:spPr>
+        <p:style>
+          <a:lnRef idx="1">
+            <a:schemeClr val="dk1"/>
+          </a:lnRef>
+          <a:fillRef idx="0">
+            <a:schemeClr val="dk1"/>
+          </a:fillRef>
+          <a:effectRef idx="0">
+            <a:schemeClr val="dk1"/>
+          </a:effectRef>
+          <a:fontRef idx="minor">
+            <a:schemeClr val="tx1"/>
+          </a:fontRef>
+        </p:style>
+      </p:cxnSp>
+      <p:cxnSp>
+        <p:nvCxnSpPr>
+          <p:cNvPr id="136" name="Straight Arrow Connector 135"/>
+          <p:cNvCxnSpPr>
+            <a:stCxn id="24" idx="2"/>
+            <a:endCxn id="25" idx="0"/>
+          </p:cNvCxnSpPr>
+          <p:nvPr/>
+        </p:nvCxnSpPr>
+        <p:spPr>
+          <a:xfrm>
+            <a:off x="5031716" y="2860991"/>
+            <a:ext cx="0" cy="285430"/>
+          </a:xfrm>
+          <a:prstGeom prst="straightConnector1">
+            <a:avLst/>
+          </a:prstGeom>
+          <a:ln>
+            <a:tailEnd type="triangle"/>
+          </a:ln>
+        </p:spPr>
+        <p:style>
+          <a:lnRef idx="1">
+            <a:schemeClr val="dk1"/>
+          </a:lnRef>
+          <a:fillRef idx="0">
+            <a:schemeClr val="dk1"/>
+          </a:fillRef>
+          <a:effectRef idx="0">
+            <a:schemeClr val="dk1"/>
+          </a:effectRef>
+          <a:fontRef idx="minor">
+            <a:schemeClr val="tx1"/>
+          </a:fontRef>
+        </p:style>
+      </p:cxnSp>
+      <p:cxnSp>
+        <p:nvCxnSpPr>
+          <p:cNvPr id="139" name="Straight Arrow Connector 138"/>
+          <p:cNvCxnSpPr>
+            <a:stCxn id="25" idx="2"/>
+            <a:endCxn id="26" idx="0"/>
+          </p:cNvCxnSpPr>
+          <p:nvPr/>
+        </p:nvCxnSpPr>
+        <p:spPr>
+          <a:xfrm>
+            <a:off x="5031716" y="3969381"/>
+            <a:ext cx="0" cy="285430"/>
+          </a:xfrm>
+          <a:prstGeom prst="straightConnector1">
+            <a:avLst/>
+          </a:prstGeom>
+          <a:ln>
+            <a:tailEnd type="triangle"/>
+          </a:ln>
+        </p:spPr>
+        <p:style>
+          <a:lnRef idx="1">
+            <a:schemeClr val="dk1"/>
+          </a:lnRef>
+          <a:fillRef idx="0">
+            <a:schemeClr val="dk1"/>
+          </a:fillRef>
+          <a:effectRef idx="0">
+            <a:schemeClr val="dk1"/>
+          </a:effectRef>
+          <a:fontRef idx="minor">
+            <a:schemeClr val="tx1"/>
+          </a:fontRef>
+        </p:style>
+      </p:cxnSp>
+      <p:cxnSp>
+        <p:nvCxnSpPr>
+          <p:cNvPr id="142" name="Straight Arrow Connector 141"/>
+          <p:cNvCxnSpPr>
+            <a:stCxn id="26" idx="2"/>
+            <a:endCxn id="27" idx="0"/>
+          </p:cNvCxnSpPr>
+          <p:nvPr/>
+        </p:nvCxnSpPr>
+        <p:spPr>
+          <a:xfrm>
+            <a:off x="5031716" y="4894891"/>
+            <a:ext cx="0" cy="285431"/>
+          </a:xfrm>
+          <a:prstGeom prst="straightConnector1">
+            <a:avLst/>
+          </a:prstGeom>
+          <a:ln>
+            <a:tailEnd type="triangle"/>
+          </a:ln>
+        </p:spPr>
+        <p:style>
+          <a:lnRef idx="1">
+            <a:schemeClr val="dk1"/>
+          </a:lnRef>
+          <a:fillRef idx="0">
+            <a:schemeClr val="dk1"/>
+          </a:fillRef>
+          <a:effectRef idx="0">
+            <a:schemeClr val="dk1"/>
+          </a:effectRef>
+          <a:fontRef idx="minor">
+            <a:schemeClr val="tx1"/>
+          </a:fontRef>
+        </p:style>
+      </p:cxnSp>
+      <p:cxnSp>
+        <p:nvCxnSpPr>
+          <p:cNvPr id="145" name="Straight Arrow Connector 144"/>
+          <p:cNvCxnSpPr>
+            <a:stCxn id="70" idx="2"/>
+            <a:endCxn id="71" idx="0"/>
+          </p:cNvCxnSpPr>
+          <p:nvPr/>
+        </p:nvCxnSpPr>
+        <p:spPr>
+          <a:xfrm>
+            <a:off x="6995160" y="2057400"/>
+            <a:ext cx="0" cy="281940"/>
+          </a:xfrm>
+          <a:prstGeom prst="straightConnector1">
+            <a:avLst/>
+          </a:prstGeom>
+          <a:ln>
+            <a:tailEnd type="triangle"/>
+          </a:ln>
+        </p:spPr>
+        <p:style>
+          <a:lnRef idx="1">
+            <a:schemeClr val="dk1"/>
+          </a:lnRef>
+          <a:fillRef idx="0">
+            <a:schemeClr val="dk1"/>
+          </a:fillRef>
+          <a:effectRef idx="0">
+            <a:schemeClr val="dk1"/>
+          </a:effectRef>
+          <a:fontRef idx="minor">
+            <a:schemeClr val="tx1"/>
+          </a:fontRef>
+        </p:style>
+      </p:cxnSp>
+      <p:cxnSp>
+        <p:nvCxnSpPr>
+          <p:cNvPr id="148" name="Straight Arrow Connector 147"/>
+          <p:cNvCxnSpPr>
+            <a:stCxn id="71" idx="2"/>
+            <a:endCxn id="72" idx="0"/>
+          </p:cNvCxnSpPr>
+          <p:nvPr/>
+        </p:nvCxnSpPr>
+        <p:spPr>
+          <a:xfrm>
+            <a:off x="6995160" y="3070860"/>
+            <a:ext cx="0" cy="281940"/>
+          </a:xfrm>
+          <a:prstGeom prst="straightConnector1">
+            <a:avLst/>
+          </a:prstGeom>
+          <a:ln>
+            <a:tailEnd type="triangle"/>
+          </a:ln>
+        </p:spPr>
+        <p:style>
+          <a:lnRef idx="1">
+            <a:schemeClr val="dk1"/>
+          </a:lnRef>
+          <a:fillRef idx="0">
+            <a:schemeClr val="dk1"/>
+          </a:fillRef>
+          <a:effectRef idx="0">
+            <a:schemeClr val="dk1"/>
+          </a:effectRef>
+          <a:fontRef idx="minor">
+            <a:schemeClr val="tx1"/>
+          </a:fontRef>
+        </p:style>
+      </p:cxnSp>
+      <p:cxnSp>
+        <p:nvCxnSpPr>
+          <p:cNvPr id="151" name="Straight Arrow Connector 150"/>
+          <p:cNvCxnSpPr>
+            <a:stCxn id="72" idx="2"/>
+            <a:endCxn id="73" idx="0"/>
+          </p:cNvCxnSpPr>
+          <p:nvPr/>
+        </p:nvCxnSpPr>
+        <p:spPr>
+          <a:xfrm>
+            <a:off x="6995160" y="4358640"/>
+            <a:ext cx="0" cy="281940"/>
+          </a:xfrm>
+          <a:prstGeom prst="straightConnector1">
+            <a:avLst/>
+          </a:prstGeom>
+          <a:ln>
+            <a:tailEnd type="triangle"/>
+          </a:ln>
+        </p:spPr>
+        <p:style>
+          <a:lnRef idx="1">
+            <a:schemeClr val="dk1"/>
+          </a:lnRef>
+          <a:fillRef idx="0">
+            <a:schemeClr val="dk1"/>
+          </a:fillRef>
+          <a:effectRef idx="0">
+            <a:schemeClr val="dk1"/>
+          </a:effectRef>
+          <a:fontRef idx="minor">
+            <a:schemeClr val="tx1"/>
+          </a:fontRef>
+        </p:style>
+      </p:cxnSp>
+      <p:cxnSp>
+        <p:nvCxnSpPr>
+          <p:cNvPr id="155" name="Straight Arrow Connector 154"/>
+          <p:cNvCxnSpPr>
+            <a:stCxn id="73" idx="2"/>
+            <a:endCxn id="74" idx="0"/>
+          </p:cNvCxnSpPr>
+          <p:nvPr/>
+        </p:nvCxnSpPr>
+        <p:spPr>
+          <a:xfrm>
+            <a:off x="6995160" y="5280660"/>
+            <a:ext cx="0" cy="281940"/>
+          </a:xfrm>
+          <a:prstGeom prst="straightConnector1">
+            <a:avLst/>
+          </a:prstGeom>
+          <a:ln>
+            <a:tailEnd type="triangle"/>
+          </a:ln>
+        </p:spPr>
+        <p:style>
+          <a:lnRef idx="1">
+            <a:schemeClr val="dk1"/>
+          </a:lnRef>
+          <a:fillRef idx="0">
+            <a:schemeClr val="dk1"/>
+          </a:fillRef>
+          <a:effectRef idx="0">
+            <a:schemeClr val="dk1"/>
+          </a:effectRef>
+          <a:fontRef idx="minor">
+            <a:schemeClr val="tx1"/>
+          </a:fontRef>
+        </p:style>
+      </p:cxnSp>
+    </p:spTree>
+    <p:extLst>
+      <p:ext uri="{BB962C8B-B14F-4D97-AF65-F5344CB8AC3E}">
+        <p14:creationId xmlns:p14="http://schemas.microsoft.com/office/powerpoint/2010/main" val="3881699673"/>
+      </p:ext>
+    </p:extLst>
+  </p:cSld>
+  <p:clrMapOvr>
+    <a:masterClrMapping/>
+  </p:clrMapOvr>
+</p:sld>
+</file>
+
+<file path=ppt/slides/slide5.xml><?xml version="1.0" encoding="utf-8"?>
+<p:sld xmlns:a="http://schemas.openxmlformats.org/drawingml/2006/main" xmlns:r="http://schemas.openxmlformats.org/officeDocument/2006/relationships" xmlns:p="http://schemas.openxmlformats.org/presentationml/2006/main">
+  <p:cSld>
+    <p:spTree>
+      <p:nvGrpSpPr>
+        <p:cNvPr id="1" name=""/>
+        <p:cNvGrpSpPr/>
+        <p:nvPr/>
+      </p:nvGrpSpPr>
+      <p:grpSpPr>
+        <a:xfrm>
+          <a:off x="0" y="0"/>
+          <a:ext cx="0" cy="0"/>
+          <a:chOff x="0" y="0"/>
+          <a:chExt cx="0" cy="0"/>
+        </a:xfrm>
+      </p:grpSpPr>
+      <p:pic>
+        <p:nvPicPr>
+          <p:cNvPr id="8" name="Picture 7"/>
+          <p:cNvPicPr>
+            <a:picLocks noChangeAspect="1"/>
+          </p:cNvPicPr>
+          <p:nvPr/>
+        </p:nvPicPr>
+        <p:blipFill>
+          <a:blip r:embed="rId2"/>
+          <a:stretch>
+            <a:fillRect/>
+          </a:stretch>
+        </p:blipFill>
+        <p:spPr>
+          <a:xfrm>
+            <a:off x="1524000" y="3505200"/>
+            <a:ext cx="5901439" cy="3005588"/>
+          </a:xfrm>
+          <a:prstGeom prst="rect">
+            <a:avLst/>
+          </a:prstGeom>
+        </p:spPr>
+      </p:pic>
+      <p:pic>
+        <p:nvPicPr>
+          <p:cNvPr id="9" name="Picture 8"/>
+          <p:cNvPicPr>
+            <a:picLocks noChangeAspect="1"/>
+          </p:cNvPicPr>
+          <p:nvPr/>
+        </p:nvPicPr>
+        <p:blipFill>
+          <a:blip r:embed="rId3"/>
+          <a:stretch>
+            <a:fillRect/>
+          </a:stretch>
+        </p:blipFill>
+        <p:spPr>
+          <a:xfrm>
+            <a:off x="1524000" y="381000"/>
+            <a:ext cx="5901439" cy="3005588"/>
+          </a:xfrm>
+          <a:prstGeom prst="rect">
+            <a:avLst/>
+          </a:prstGeom>
+        </p:spPr>
+      </p:pic>
+    </p:spTree>
+    <p:extLst>
+      <p:ext uri="{BB962C8B-B14F-4D97-AF65-F5344CB8AC3E}">
+        <p14:creationId xmlns:p14="http://schemas.microsoft.com/office/powerpoint/2010/main" val="2625950855"/>
       </p:ext>
     </p:extLst>
   </p:cSld>

</xml_diff>

<commit_message>
Minor edits to the documentation and installation instructions resulting from testing on non-anaconda python installations
</commit_message>
<xml_diff>
--- a/documentation/figures/figures.pptx
+++ b/documentation/figures/figures.pptx
@@ -307,7 +307,7 @@
             <a:fld id="{1D8BD707-D9CF-40AE-B4C6-C98DA3205C09}" type="datetimeFigureOut">
               <a:rPr lang="en-US" smtClean="0"/>
               <a:pPr/>
-              <a:t>2/23/2017</a:t>
+              <a:t>4/13/17</a:t>
             </a:fld>
             <a:endParaRPr lang="en-US"/>
           </a:p>
@@ -472,7 +472,7 @@
             <a:fld id="{1D8BD707-D9CF-40AE-B4C6-C98DA3205C09}" type="datetimeFigureOut">
               <a:rPr lang="en-US" smtClean="0"/>
               <a:pPr/>
-              <a:t>2/23/2017</a:t>
+              <a:t>4/13/17</a:t>
             </a:fld>
             <a:endParaRPr lang="en-US"/>
           </a:p>
@@ -647,7 +647,7 @@
             <a:fld id="{1D8BD707-D9CF-40AE-B4C6-C98DA3205C09}" type="datetimeFigureOut">
               <a:rPr lang="en-US" smtClean="0"/>
               <a:pPr/>
-              <a:t>2/23/2017</a:t>
+              <a:t>4/13/17</a:t>
             </a:fld>
             <a:endParaRPr lang="en-US"/>
           </a:p>
@@ -812,7 +812,7 @@
             <a:fld id="{1D8BD707-D9CF-40AE-B4C6-C98DA3205C09}" type="datetimeFigureOut">
               <a:rPr lang="en-US" smtClean="0"/>
               <a:pPr/>
-              <a:t>2/23/2017</a:t>
+              <a:t>4/13/17</a:t>
             </a:fld>
             <a:endParaRPr lang="en-US"/>
           </a:p>
@@ -1054,7 +1054,7 @@
             <a:fld id="{1D8BD707-D9CF-40AE-B4C6-C98DA3205C09}" type="datetimeFigureOut">
               <a:rPr lang="en-US" smtClean="0"/>
               <a:pPr/>
-              <a:t>2/23/2017</a:t>
+              <a:t>4/13/17</a:t>
             </a:fld>
             <a:endParaRPr lang="en-US"/>
           </a:p>
@@ -1336,7 +1336,7 @@
             <a:fld id="{1D8BD707-D9CF-40AE-B4C6-C98DA3205C09}" type="datetimeFigureOut">
               <a:rPr lang="en-US" smtClean="0"/>
               <a:pPr/>
-              <a:t>2/23/2017</a:t>
+              <a:t>4/13/17</a:t>
             </a:fld>
             <a:endParaRPr lang="en-US"/>
           </a:p>
@@ -1752,7 +1752,7 @@
             <a:fld id="{1D8BD707-D9CF-40AE-B4C6-C98DA3205C09}" type="datetimeFigureOut">
               <a:rPr lang="en-US" smtClean="0"/>
               <a:pPr/>
-              <a:t>2/23/2017</a:t>
+              <a:t>4/13/17</a:t>
             </a:fld>
             <a:endParaRPr lang="en-US"/>
           </a:p>
@@ -1866,7 +1866,7 @@
             <a:fld id="{1D8BD707-D9CF-40AE-B4C6-C98DA3205C09}" type="datetimeFigureOut">
               <a:rPr lang="en-US" smtClean="0"/>
               <a:pPr/>
-              <a:t>2/23/2017</a:t>
+              <a:t>4/13/17</a:t>
             </a:fld>
             <a:endParaRPr lang="en-US"/>
           </a:p>
@@ -1958,7 +1958,7 @@
             <a:fld id="{1D8BD707-D9CF-40AE-B4C6-C98DA3205C09}" type="datetimeFigureOut">
               <a:rPr lang="en-US" smtClean="0"/>
               <a:pPr/>
-              <a:t>2/23/2017</a:t>
+              <a:t>4/13/17</a:t>
             </a:fld>
             <a:endParaRPr lang="en-US"/>
           </a:p>
@@ -2230,7 +2230,7 @@
             <a:fld id="{1D8BD707-D9CF-40AE-B4C6-C98DA3205C09}" type="datetimeFigureOut">
               <a:rPr lang="en-US" smtClean="0"/>
               <a:pPr/>
-              <a:t>2/23/2017</a:t>
+              <a:t>4/13/17</a:t>
             </a:fld>
             <a:endParaRPr lang="en-US"/>
           </a:p>
@@ -2479,7 +2479,7 @@
             <a:fld id="{1D8BD707-D9CF-40AE-B4C6-C98DA3205C09}" type="datetimeFigureOut">
               <a:rPr lang="en-US" smtClean="0"/>
               <a:pPr/>
-              <a:t>2/23/2017</a:t>
+              <a:t>4/13/17</a:t>
             </a:fld>
             <a:endParaRPr lang="en-US"/>
           </a:p>
@@ -2687,7 +2687,7 @@
             <a:fld id="{1D8BD707-D9CF-40AE-B4C6-C98DA3205C09}" type="datetimeFigureOut">
               <a:rPr lang="en-US" smtClean="0"/>
               <a:pPr/>
-              <a:t>2/23/2017</a:t>
+              <a:t>4/13/17</a:t>
             </a:fld>
             <a:endParaRPr lang="en-US"/>
           </a:p>
@@ -4962,7 +4962,7 @@
         </p:nvSpPr>
         <p:spPr>
           <a:xfrm>
-            <a:off x="990600" y="2209800"/>
+            <a:off x="90183" y="2215864"/>
             <a:ext cx="1371600" cy="731520"/>
           </a:xfrm>
           <a:prstGeom prst="roundRect">
@@ -4990,7 +4990,15 @@
             <a:pPr algn="ctr"/>
             <a:r>
               <a:rPr lang="en-US" sz="1200" dirty="0"/>
-              <a:t>Modify the network structure and operations</a:t>
+              <a:t>Modify </a:t>
+            </a:r>
+            <a:r>
+              <a:rPr lang="en-US" sz="1200" dirty="0" smtClean="0"/>
+              <a:t>the network </a:t>
+            </a:r>
+            <a:r>
+              <a:rPr lang="en-US" sz="1200" dirty="0"/>
+              <a:t>structure and operations</a:t>
             </a:r>
           </a:p>
         </p:txBody>
@@ -5003,7 +5011,7 @@
         </p:nvSpPr>
         <p:spPr>
           <a:xfrm>
-            <a:off x="990600" y="3810000"/>
+            <a:off x="90183" y="3779520"/>
             <a:ext cx="1371600" cy="731520"/>
           </a:xfrm>
           <a:prstGeom prst="roundRect">
@@ -5047,8 +5055,8 @@
         </p:nvCxnSpPr>
         <p:spPr>
           <a:xfrm>
-            <a:off x="1676400" y="2941320"/>
-            <a:ext cx="0" cy="868680"/>
+            <a:off x="775983" y="2947384"/>
+            <a:ext cx="0" cy="832136"/>
           </a:xfrm>
           <a:prstGeom prst="straightConnector1">
             <a:avLst/>
@@ -5080,7 +5088,7 @@
         </p:nvSpPr>
         <p:spPr>
           <a:xfrm>
-            <a:off x="2514600" y="1447800"/>
+            <a:off x="1600200" y="1398949"/>
             <a:ext cx="1188720" cy="640080"/>
           </a:xfrm>
           <a:prstGeom prst="roundRect">
@@ -5121,7 +5129,7 @@
         </p:nvSpPr>
         <p:spPr>
           <a:xfrm>
-            <a:off x="3383280" y="423509"/>
+            <a:off x="3992880" y="423509"/>
             <a:ext cx="1371600" cy="640080"/>
           </a:xfrm>
           <a:prstGeom prst="roundRect">
@@ -5169,7 +5177,7 @@
         </p:nvSpPr>
         <p:spPr>
           <a:xfrm>
-            <a:off x="2514600" y="3032760"/>
+            <a:off x="1600200" y="2983909"/>
             <a:ext cx="1188720" cy="640080"/>
           </a:xfrm>
           <a:prstGeom prst="roundRect">
@@ -5210,7 +5218,7 @@
         </p:nvSpPr>
         <p:spPr>
           <a:xfrm>
-            <a:off x="2514600" y="4617720"/>
+            <a:off x="1600200" y="4568869"/>
             <a:ext cx="1188720" cy="640080"/>
           </a:xfrm>
           <a:prstGeom prst="roundRect">
@@ -5255,7 +5263,7 @@
         </p:nvSpPr>
         <p:spPr>
           <a:xfrm>
-            <a:off x="3383280" y="6023841"/>
+            <a:off x="3992880" y="6023841"/>
             <a:ext cx="1463040" cy="640080"/>
           </a:xfrm>
           <a:prstGeom prst="roundRect">
@@ -5303,7 +5311,7 @@
         </p:nvSpPr>
         <p:spPr>
           <a:xfrm>
-            <a:off x="4208756" y="1295400"/>
+            <a:off x="4925034" y="1295400"/>
             <a:ext cx="1645920" cy="731520"/>
           </a:xfrm>
           <a:prstGeom prst="roundRect">
@@ -5344,7 +5352,7 @@
         </p:nvSpPr>
         <p:spPr>
           <a:xfrm>
-            <a:off x="4208756" y="2312351"/>
+            <a:off x="4925034" y="2312351"/>
             <a:ext cx="1645920" cy="548640"/>
           </a:xfrm>
           <a:prstGeom prst="roundRect">
@@ -5385,7 +5393,7 @@
         </p:nvSpPr>
         <p:spPr>
           <a:xfrm>
-            <a:off x="4208756" y="3146421"/>
+            <a:off x="4925034" y="3146421"/>
             <a:ext cx="1645920" cy="822960"/>
           </a:xfrm>
           <a:prstGeom prst="roundRect">
@@ -5426,7 +5434,7 @@
         </p:nvSpPr>
         <p:spPr>
           <a:xfrm>
-            <a:off x="4208756" y="4254811"/>
+            <a:off x="4925034" y="4254811"/>
             <a:ext cx="1645920" cy="640080"/>
           </a:xfrm>
           <a:prstGeom prst="roundRect">
@@ -5467,7 +5475,7 @@
         </p:nvSpPr>
         <p:spPr>
           <a:xfrm>
-            <a:off x="4208756" y="5180322"/>
+            <a:off x="4925034" y="5180322"/>
             <a:ext cx="1645920" cy="548640"/>
           </a:xfrm>
           <a:prstGeom prst="roundRect">
@@ -5515,8 +5523,8 @@
         </p:nvCxnSpPr>
         <p:spPr>
           <a:xfrm rot="10800000" flipV="1">
-            <a:off x="1676400" y="743548"/>
-            <a:ext cx="1706880" cy="1466251"/>
+            <a:off x="775984" y="743548"/>
+            <a:ext cx="3216897" cy="1472315"/>
           </a:xfrm>
           <a:prstGeom prst="bentConnector2">
             <a:avLst/>
@@ -5551,8 +5559,8 @@
         </p:nvCxnSpPr>
         <p:spPr>
           <a:xfrm rot="16200000" flipH="1">
-            <a:off x="1628660" y="4589260"/>
-            <a:ext cx="1802361" cy="1706880"/>
+            <a:off x="1468011" y="3819011"/>
+            <a:ext cx="1832841" cy="3216897"/>
           </a:xfrm>
           <a:prstGeom prst="bentConnector2">
             <a:avLst/>
@@ -5587,8 +5595,8 @@
         </p:nvCxnSpPr>
         <p:spPr>
           <a:xfrm rot="10800000" flipV="1">
-            <a:off x="3108960" y="743548"/>
-            <a:ext cx="274320" cy="704251"/>
+            <a:off x="2194560" y="743549"/>
+            <a:ext cx="1798320" cy="655400"/>
           </a:xfrm>
           <a:prstGeom prst="bentConnector2">
             <a:avLst/>
@@ -5623,7 +5631,7 @@
         </p:nvCxnSpPr>
         <p:spPr>
           <a:xfrm>
-            <a:off x="3108960" y="2087880"/>
+            <a:off x="2194560" y="2039029"/>
             <a:ext cx="0" cy="944880"/>
           </a:xfrm>
           <a:prstGeom prst="straightConnector1">
@@ -5659,7 +5667,7 @@
         </p:nvCxnSpPr>
         <p:spPr>
           <a:xfrm>
-            <a:off x="3108960" y="3672840"/>
+            <a:off x="2194560" y="3623989"/>
             <a:ext cx="0" cy="944880"/>
           </a:xfrm>
           <a:prstGeom prst="straightConnector1">
@@ -5692,7 +5700,7 @@
         </p:nvSpPr>
         <p:spPr>
           <a:xfrm>
-            <a:off x="6172200" y="1051560"/>
+            <a:off x="6888478" y="1051560"/>
             <a:ext cx="1645920" cy="1005840"/>
           </a:xfrm>
           <a:prstGeom prst="roundRect">
@@ -5733,7 +5741,7 @@
         </p:nvSpPr>
         <p:spPr>
           <a:xfrm>
-            <a:off x="6172200" y="2339340"/>
+            <a:off x="6888478" y="2339340"/>
             <a:ext cx="1645920" cy="731520"/>
           </a:xfrm>
           <a:prstGeom prst="roundRect">
@@ -5774,7 +5782,7 @@
         </p:nvSpPr>
         <p:spPr>
           <a:xfrm>
-            <a:off x="6172200" y="3352800"/>
+            <a:off x="6888478" y="3352800"/>
             <a:ext cx="1645920" cy="1005840"/>
           </a:xfrm>
           <a:prstGeom prst="roundRect">
@@ -5815,7 +5823,7 @@
         </p:nvSpPr>
         <p:spPr>
           <a:xfrm>
-            <a:off x="6172200" y="4640580"/>
+            <a:off x="6888478" y="4640580"/>
             <a:ext cx="1645920" cy="640080"/>
           </a:xfrm>
           <a:prstGeom prst="roundRect">
@@ -5856,7 +5864,7 @@
         </p:nvSpPr>
         <p:spPr>
           <a:xfrm>
-            <a:off x="6172200" y="5562600"/>
+            <a:off x="6888478" y="5562600"/>
             <a:ext cx="1645920" cy="457200"/>
           </a:xfrm>
           <a:prstGeom prst="roundRect">
@@ -5900,7 +5908,7 @@
         </p:nvCxnSpPr>
         <p:spPr>
           <a:xfrm flipV="1">
-            <a:off x="7818120" y="2705100"/>
+            <a:off x="8534398" y="2705100"/>
             <a:ext cx="12700" cy="3086100"/>
           </a:xfrm>
           <a:prstGeom prst="bentConnector3">
@@ -5938,8 +5946,8 @@
         </p:nvCxnSpPr>
         <p:spPr>
           <a:xfrm rot="16200000" flipH="1">
-            <a:off x="2703080" y="5663680"/>
-            <a:ext cx="1086081" cy="274320"/>
+            <a:off x="2526254" y="4877255"/>
+            <a:ext cx="1134932" cy="1798320"/>
           </a:xfrm>
           <a:prstGeom prst="bentConnector2">
             <a:avLst/>
@@ -5971,7 +5979,7 @@
         </p:nvSpPr>
         <p:spPr>
           <a:xfrm>
-            <a:off x="1285920" y="114390"/>
+            <a:off x="466442" y="153586"/>
             <a:ext cx="619080" cy="276999"/>
           </a:xfrm>
           <a:prstGeom prst="rect">
@@ -6007,8 +6015,8 @@
         </p:nvCxnSpPr>
         <p:spPr>
           <a:xfrm>
-            <a:off x="1905000" y="252890"/>
-            <a:ext cx="4800600" cy="0"/>
+            <a:off x="1085522" y="292086"/>
+            <a:ext cx="6815477" cy="0"/>
           </a:xfrm>
           <a:prstGeom prst="straightConnector1">
             <a:avLst/>
@@ -6040,7 +6048,7 @@
         </p:nvSpPr>
         <p:spPr>
           <a:xfrm>
-            <a:off x="6705600" y="114390"/>
+            <a:off x="7900999" y="153586"/>
             <a:ext cx="741678" cy="276999"/>
           </a:xfrm>
           <a:prstGeom prst="rect">
@@ -6076,8 +6084,8 @@
         </p:nvCxnSpPr>
         <p:spPr>
           <a:xfrm rot="5400000">
-            <a:off x="5758700" y="5107420"/>
-            <a:ext cx="324081" cy="2148840"/>
+            <a:off x="6421639" y="5054081"/>
+            <a:ext cx="324081" cy="2255518"/>
           </a:xfrm>
           <a:prstGeom prst="bentConnector2">
             <a:avLst/>
@@ -6105,14 +6113,13 @@
         <p:nvCxnSpPr>
           <p:cNvPr id="109" name="Elbow Connector 108"/>
           <p:cNvCxnSpPr>
-            <a:stCxn id="18" idx="3"/>
             <a:endCxn id="70" idx="0"/>
           </p:cNvCxnSpPr>
           <p:nvPr/>
         </p:nvCxnSpPr>
         <p:spPr>
           <a:xfrm>
-            <a:off x="4754880" y="743549"/>
+            <a:off x="5471158" y="743549"/>
             <a:ext cx="2240280" cy="308011"/>
           </a:xfrm>
           <a:prstGeom prst="bentConnector2">
@@ -6148,8 +6155,8 @@
         </p:nvCxnSpPr>
         <p:spPr>
           <a:xfrm>
-            <a:off x="4754880" y="743549"/>
-            <a:ext cx="276836" cy="551851"/>
+            <a:off x="5364480" y="743549"/>
+            <a:ext cx="383514" cy="551851"/>
           </a:xfrm>
           <a:prstGeom prst="bentConnector2">
             <a:avLst/>
@@ -6181,7 +6188,7 @@
         </p:nvSpPr>
         <p:spPr>
           <a:xfrm rot="16200000">
-            <a:off x="7102301" y="3956131"/>
+            <a:off x="7818579" y="3956131"/>
             <a:ext cx="2221442" cy="276999"/>
           </a:xfrm>
           <a:prstGeom prst="rect">
@@ -6207,13 +6214,12 @@
           <p:cNvPr id="130" name="Elbow Connector 129"/>
           <p:cNvCxnSpPr>
             <a:stCxn id="27" idx="2"/>
-            <a:endCxn id="21" idx="3"/>
           </p:cNvCxnSpPr>
           <p:nvPr/>
         </p:nvCxnSpPr>
         <p:spPr>
           <a:xfrm rot="5400000">
-            <a:off x="4631559" y="5943723"/>
+            <a:off x="5347837" y="5943723"/>
             <a:ext cx="614919" cy="185396"/>
           </a:xfrm>
           <a:prstGeom prst="bentConnector2">
@@ -6249,7 +6255,7 @@
         </p:nvCxnSpPr>
         <p:spPr>
           <a:xfrm>
-            <a:off x="5031716" y="2026920"/>
+            <a:off x="5747994" y="2026920"/>
             <a:ext cx="0" cy="285431"/>
           </a:xfrm>
           <a:prstGeom prst="straightConnector1">
@@ -6285,7 +6291,7 @@
         </p:nvCxnSpPr>
         <p:spPr>
           <a:xfrm>
-            <a:off x="5031716" y="2860991"/>
+            <a:off x="5747994" y="2860991"/>
             <a:ext cx="0" cy="285430"/>
           </a:xfrm>
           <a:prstGeom prst="straightConnector1">
@@ -6321,7 +6327,7 @@
         </p:nvCxnSpPr>
         <p:spPr>
           <a:xfrm>
-            <a:off x="5031716" y="3969381"/>
+            <a:off x="5747994" y="3969381"/>
             <a:ext cx="0" cy="285430"/>
           </a:xfrm>
           <a:prstGeom prst="straightConnector1">
@@ -6357,7 +6363,7 @@
         </p:nvCxnSpPr>
         <p:spPr>
           <a:xfrm>
-            <a:off x="5031716" y="4894891"/>
+            <a:off x="5747994" y="4894891"/>
             <a:ext cx="0" cy="285431"/>
           </a:xfrm>
           <a:prstGeom prst="straightConnector1">
@@ -6393,7 +6399,7 @@
         </p:nvCxnSpPr>
         <p:spPr>
           <a:xfrm>
-            <a:off x="6995160" y="2057400"/>
+            <a:off x="7711438" y="2057400"/>
             <a:ext cx="0" cy="281940"/>
           </a:xfrm>
           <a:prstGeom prst="straightConnector1">
@@ -6429,7 +6435,7 @@
         </p:nvCxnSpPr>
         <p:spPr>
           <a:xfrm>
-            <a:off x="6995160" y="3070860"/>
+            <a:off x="7711438" y="3070860"/>
             <a:ext cx="0" cy="281940"/>
           </a:xfrm>
           <a:prstGeom prst="straightConnector1">
@@ -6465,7 +6471,7 @@
         </p:nvCxnSpPr>
         <p:spPr>
           <a:xfrm>
-            <a:off x="6995160" y="4358640"/>
+            <a:off x="7711438" y="4358640"/>
             <a:ext cx="0" cy="281940"/>
           </a:xfrm>
           <a:prstGeom prst="straightConnector1">
@@ -6501,10 +6507,403 @@
         </p:nvCxnSpPr>
         <p:spPr>
           <a:xfrm>
-            <a:off x="6995160" y="5280660"/>
+            <a:off x="7711438" y="5280660"/>
             <a:ext cx="0" cy="281940"/>
           </a:xfrm>
           <a:prstGeom prst="straightConnector1">
+            <a:avLst/>
+          </a:prstGeom>
+          <a:ln>
+            <a:tailEnd type="triangle"/>
+          </a:ln>
+        </p:spPr>
+        <p:style>
+          <a:lnRef idx="1">
+            <a:schemeClr val="dk1"/>
+          </a:lnRef>
+          <a:fillRef idx="0">
+            <a:schemeClr val="dk1"/>
+          </a:fillRef>
+          <a:effectRef idx="0">
+            <a:schemeClr val="dk1"/>
+          </a:effectRef>
+          <a:fontRef idx="minor">
+            <a:schemeClr val="tx1"/>
+          </a:fontRef>
+        </p:style>
+      </p:cxnSp>
+      <p:sp>
+        <p:nvSpPr>
+          <p:cNvPr id="68" name="Rounded Rectangle 67"/>
+          <p:cNvSpPr/>
+          <p:nvPr/>
+        </p:nvSpPr>
+        <p:spPr>
+          <a:xfrm>
+            <a:off x="3065825" y="1295400"/>
+            <a:ext cx="1371601" cy="637403"/>
+          </a:xfrm>
+          <a:prstGeom prst="roundRect">
+            <a:avLst/>
+          </a:prstGeom>
+        </p:spPr>
+        <p:style>
+          <a:lnRef idx="1">
+            <a:schemeClr val="dk1"/>
+          </a:lnRef>
+          <a:fillRef idx="2">
+            <a:schemeClr val="dk1"/>
+          </a:fillRef>
+          <a:effectRef idx="1">
+            <a:schemeClr val="dk1"/>
+          </a:effectRef>
+          <a:fontRef idx="minor">
+            <a:schemeClr val="dk1"/>
+          </a:fontRef>
+        </p:style>
+        <p:txBody>
+          <a:bodyPr rtlCol="0" anchor="ctr"/>
+          <a:lstStyle/>
+          <a:p>
+            <a:pPr algn="ctr"/>
+            <a:r>
+              <a:rPr lang="en-US" sz="1200" dirty="0"/>
+              <a:t>Run </a:t>
+            </a:r>
+            <a:r>
+              <a:rPr lang="en-US" sz="1200" dirty="0" smtClean="0"/>
+              <a:t>a hydraulic simulation</a:t>
+            </a:r>
+            <a:endParaRPr lang="en-US" sz="1200" dirty="0"/>
+          </a:p>
+        </p:txBody>
+      </p:sp>
+      <p:sp>
+        <p:nvSpPr>
+          <p:cNvPr id="77" name="Rounded Rectangle 76"/>
+          <p:cNvSpPr/>
+          <p:nvPr/>
+        </p:nvSpPr>
+        <p:spPr>
+          <a:xfrm>
+            <a:off x="3063309" y="4793677"/>
+            <a:ext cx="1371600" cy="640080"/>
+          </a:xfrm>
+          <a:prstGeom prst="roundRect">
+            <a:avLst/>
+          </a:prstGeom>
+        </p:spPr>
+        <p:style>
+          <a:lnRef idx="1">
+            <a:schemeClr val="dk1"/>
+          </a:lnRef>
+          <a:fillRef idx="2">
+            <a:schemeClr val="dk1"/>
+          </a:fillRef>
+          <a:effectRef idx="1">
+            <a:schemeClr val="dk1"/>
+          </a:effectRef>
+          <a:fontRef idx="minor">
+            <a:schemeClr val="dk1"/>
+          </a:fontRef>
+        </p:style>
+        <p:txBody>
+          <a:bodyPr rtlCol="0" anchor="ctr"/>
+          <a:lstStyle/>
+          <a:p>
+            <a:pPr algn="ctr"/>
+            <a:r>
+              <a:rPr lang="en-US" sz="1200" dirty="0"/>
+              <a:t>Rerun the hydraulic </a:t>
+            </a:r>
+            <a:r>
+              <a:rPr lang="en-US" sz="1200" dirty="0" smtClean="0"/>
+              <a:t>simulation</a:t>
+            </a:r>
+            <a:endParaRPr lang="en-US" sz="1200" dirty="0"/>
+          </a:p>
+        </p:txBody>
+      </p:sp>
+      <p:cxnSp>
+        <p:nvCxnSpPr>
+          <p:cNvPr id="80" name="Elbow Connector 79"/>
+          <p:cNvCxnSpPr>
+            <a:stCxn id="77" idx="2"/>
+            <a:endCxn id="21" idx="1"/>
+          </p:cNvCxnSpPr>
+          <p:nvPr/>
+        </p:nvCxnSpPr>
+        <p:spPr>
+          <a:xfrm rot="16200000" flipH="1">
+            <a:off x="3415932" y="5766933"/>
+            <a:ext cx="910124" cy="243771"/>
+          </a:xfrm>
+          <a:prstGeom prst="bentConnector2">
+            <a:avLst/>
+          </a:prstGeom>
+          <a:ln>
+            <a:tailEnd type="triangle"/>
+          </a:ln>
+        </p:spPr>
+        <p:style>
+          <a:lnRef idx="1">
+            <a:schemeClr val="dk1"/>
+          </a:lnRef>
+          <a:fillRef idx="0">
+            <a:schemeClr val="dk1"/>
+          </a:fillRef>
+          <a:effectRef idx="0">
+            <a:schemeClr val="dk1"/>
+          </a:effectRef>
+          <a:fontRef idx="minor">
+            <a:schemeClr val="tx1"/>
+          </a:fontRef>
+        </p:style>
+      </p:cxnSp>
+      <p:cxnSp>
+        <p:nvCxnSpPr>
+          <p:cNvPr id="81" name="Straight Arrow Connector 80"/>
+          <p:cNvCxnSpPr>
+            <a:stCxn id="106" idx="2"/>
+            <a:endCxn id="89" idx="0"/>
+          </p:cNvCxnSpPr>
+          <p:nvPr/>
+        </p:nvCxnSpPr>
+        <p:spPr>
+          <a:xfrm>
+            <a:off x="3749109" y="2987040"/>
+            <a:ext cx="2516" cy="531252"/>
+          </a:xfrm>
+          <a:prstGeom prst="straightConnector1">
+            <a:avLst/>
+          </a:prstGeom>
+          <a:ln>
+            <a:tailEnd type="triangle"/>
+          </a:ln>
+        </p:spPr>
+        <p:style>
+          <a:lnRef idx="1">
+            <a:schemeClr val="dk1"/>
+          </a:lnRef>
+          <a:fillRef idx="0">
+            <a:schemeClr val="dk1"/>
+          </a:fillRef>
+          <a:effectRef idx="0">
+            <a:schemeClr val="dk1"/>
+          </a:effectRef>
+          <a:fontRef idx="minor">
+            <a:schemeClr val="tx1"/>
+          </a:fontRef>
+        </p:style>
+      </p:cxnSp>
+      <p:cxnSp>
+        <p:nvCxnSpPr>
+          <p:cNvPr id="84" name="Straight Arrow Connector 83"/>
+          <p:cNvCxnSpPr>
+            <a:stCxn id="89" idx="2"/>
+            <a:endCxn id="77" idx="0"/>
+          </p:cNvCxnSpPr>
+          <p:nvPr/>
+        </p:nvCxnSpPr>
+        <p:spPr>
+          <a:xfrm flipH="1">
+            <a:off x="3749109" y="4249812"/>
+            <a:ext cx="2516" cy="543865"/>
+          </a:xfrm>
+          <a:prstGeom prst="straightConnector1">
+            <a:avLst/>
+          </a:prstGeom>
+          <a:ln>
+            <a:tailEnd type="triangle"/>
+          </a:ln>
+        </p:spPr>
+        <p:style>
+          <a:lnRef idx="1">
+            <a:schemeClr val="dk1"/>
+          </a:lnRef>
+          <a:fillRef idx="0">
+            <a:schemeClr val="dk1"/>
+          </a:fillRef>
+          <a:effectRef idx="0">
+            <a:schemeClr val="dk1"/>
+          </a:effectRef>
+          <a:fontRef idx="minor">
+            <a:schemeClr val="tx1"/>
+          </a:fontRef>
+        </p:style>
+      </p:cxnSp>
+      <p:sp>
+        <p:nvSpPr>
+          <p:cNvPr id="89" name="Rounded Rectangle 88"/>
+          <p:cNvSpPr/>
+          <p:nvPr/>
+        </p:nvSpPr>
+        <p:spPr>
+          <a:xfrm>
+            <a:off x="3065825" y="3518292"/>
+            <a:ext cx="1371600" cy="731520"/>
+          </a:xfrm>
+          <a:prstGeom prst="roundRect">
+            <a:avLst/>
+          </a:prstGeom>
+        </p:spPr>
+        <p:style>
+          <a:lnRef idx="1">
+            <a:schemeClr val="dk1"/>
+          </a:lnRef>
+          <a:fillRef idx="2">
+            <a:schemeClr val="dk1"/>
+          </a:fillRef>
+          <a:effectRef idx="1">
+            <a:schemeClr val="dk1"/>
+          </a:effectRef>
+          <a:fontRef idx="minor">
+            <a:schemeClr val="dk1"/>
+          </a:fontRef>
+        </p:style>
+        <p:txBody>
+          <a:bodyPr rtlCol="0" anchor="ctr"/>
+          <a:lstStyle/>
+          <a:p>
+            <a:pPr algn="ctr"/>
+            <a:r>
+              <a:rPr lang="en-US" sz="1200" dirty="0"/>
+              <a:t>Modify the network structure and operations</a:t>
+            </a:r>
+          </a:p>
+        </p:txBody>
+      </p:sp>
+      <p:sp>
+        <p:nvSpPr>
+          <p:cNvPr id="106" name="Rounded Rectangle 105"/>
+          <p:cNvSpPr/>
+          <p:nvPr/>
+        </p:nvSpPr>
+        <p:spPr>
+          <a:xfrm>
+            <a:off x="3048000" y="2438400"/>
+            <a:ext cx="1402218" cy="548640"/>
+          </a:xfrm>
+          <a:prstGeom prst="roundRect">
+            <a:avLst/>
+          </a:prstGeom>
+        </p:spPr>
+        <p:style>
+          <a:lnRef idx="1">
+            <a:schemeClr val="dk1"/>
+          </a:lnRef>
+          <a:fillRef idx="2">
+            <a:schemeClr val="dk1"/>
+          </a:fillRef>
+          <a:effectRef idx="1">
+            <a:schemeClr val="dk1"/>
+          </a:effectRef>
+          <a:fontRef idx="minor">
+            <a:schemeClr val="dk1"/>
+          </a:fontRef>
+        </p:style>
+        <p:txBody>
+          <a:bodyPr rtlCol="0" anchor="ctr"/>
+          <a:lstStyle/>
+          <a:p>
+            <a:pPr algn="ctr"/>
+            <a:r>
+              <a:rPr lang="en-US" sz="1200" smtClean="0"/>
+              <a:t>Analyze pressures</a:t>
+            </a:r>
+            <a:endParaRPr lang="en-US" sz="1200" dirty="0"/>
+          </a:p>
+        </p:txBody>
+      </p:sp>
+      <p:cxnSp>
+        <p:nvCxnSpPr>
+          <p:cNvPr id="107" name="Straight Arrow Connector 106"/>
+          <p:cNvCxnSpPr>
+            <a:stCxn id="68" idx="2"/>
+            <a:endCxn id="106" idx="0"/>
+          </p:cNvCxnSpPr>
+          <p:nvPr/>
+        </p:nvCxnSpPr>
+        <p:spPr>
+          <a:xfrm flipH="1">
+            <a:off x="3749109" y="1932803"/>
+            <a:ext cx="2517" cy="505597"/>
+          </a:xfrm>
+          <a:prstGeom prst="straightConnector1">
+            <a:avLst/>
+          </a:prstGeom>
+          <a:ln>
+            <a:tailEnd type="triangle"/>
+          </a:ln>
+        </p:spPr>
+        <p:style>
+          <a:lnRef idx="1">
+            <a:schemeClr val="dk1"/>
+          </a:lnRef>
+          <a:fillRef idx="0">
+            <a:schemeClr val="dk1"/>
+          </a:fillRef>
+          <a:effectRef idx="0">
+            <a:schemeClr val="dk1"/>
+          </a:effectRef>
+          <a:fontRef idx="minor">
+            <a:schemeClr val="tx1"/>
+          </a:fontRef>
+        </p:style>
+      </p:cxnSp>
+      <p:cxnSp>
+        <p:nvCxnSpPr>
+          <p:cNvPr id="120" name="Elbow Connector 119"/>
+          <p:cNvCxnSpPr>
+            <a:stCxn id="77" idx="3"/>
+            <a:endCxn id="106" idx="3"/>
+          </p:cNvCxnSpPr>
+          <p:nvPr/>
+        </p:nvCxnSpPr>
+        <p:spPr>
+          <a:xfrm flipV="1">
+            <a:off x="4434909" y="2712720"/>
+            <a:ext cx="15309" cy="2400997"/>
+          </a:xfrm>
+          <a:prstGeom prst="bentConnector3">
+            <a:avLst>
+              <a:gd name="adj1" fmla="val 1593239"/>
+            </a:avLst>
+          </a:prstGeom>
+          <a:ln>
+            <a:tailEnd type="triangle"/>
+          </a:ln>
+        </p:spPr>
+        <p:style>
+          <a:lnRef idx="1">
+            <a:schemeClr val="dk1"/>
+          </a:lnRef>
+          <a:fillRef idx="0">
+            <a:schemeClr val="dk1"/>
+          </a:fillRef>
+          <a:effectRef idx="0">
+            <a:schemeClr val="dk1"/>
+          </a:effectRef>
+          <a:fontRef idx="minor">
+            <a:schemeClr val="tx1"/>
+          </a:fontRef>
+        </p:style>
+      </p:cxnSp>
+      <p:cxnSp>
+        <p:nvCxnSpPr>
+          <p:cNvPr id="131" name="Elbow Connector 130"/>
+          <p:cNvCxnSpPr>
+            <a:stCxn id="18" idx="1"/>
+            <a:endCxn id="68" idx="0"/>
+          </p:cNvCxnSpPr>
+          <p:nvPr/>
+        </p:nvCxnSpPr>
+        <p:spPr>
+          <a:xfrm rot="10800000" flipV="1">
+            <a:off x="3751626" y="743548"/>
+            <a:ext cx="241254" cy="551851"/>
+          </a:xfrm>
+          <a:prstGeom prst="bentConnector2">
             <a:avLst/>
           </a:prstGeom>
           <a:ln>

</xml_diff>